<commit_message>
Add Docker commands for working with Powershell Container
</commit_message>
<xml_diff>
--- a/Automation/EnvironmentAutomationGroupBy2021.pptx
+++ b/Automation/EnvironmentAutomationGroupBy2021.pptx
@@ -6,7 +6,7 @@
     <p:sldMasterId id="2147483652" r:id="rId5"/>
   </p:sldMasterIdLst>
   <p:notesMasterIdLst>
-    <p:notesMasterId r:id="rId38"/>
+    <p:notesMasterId r:id="rId41"/>
   </p:notesMasterIdLst>
   <p:sldIdLst>
     <p:sldId id="285" r:id="rId6"/>
@@ -39,8 +39,11 @@
     <p:sldId id="335" r:id="rId33"/>
     <p:sldId id="336" r:id="rId34"/>
     <p:sldId id="337" r:id="rId35"/>
-    <p:sldId id="338" r:id="rId36"/>
-    <p:sldId id="339" r:id="rId37"/>
+    <p:sldId id="340" r:id="rId36"/>
+    <p:sldId id="344" r:id="rId37"/>
+    <p:sldId id="342" r:id="rId38"/>
+    <p:sldId id="343" r:id="rId39"/>
+    <p:sldId id="339" r:id="rId40"/>
   </p:sldIdLst>
   <p:sldSz cx="12192000" cy="6858000"/>
   <p:notesSz cx="6858000" cy="9144000"/>
@@ -10584,7 +10587,7 @@
         <p:spPr>
           <a:xfrm>
             <a:off x="838199" y="1645920"/>
-            <a:ext cx="10515785" cy="3046988"/>
+            <a:ext cx="10515785" cy="3539430"/>
           </a:xfrm>
           <a:prstGeom prst="rect">
             <a:avLst/>
@@ -10713,6 +10716,26 @@
                 <a:latin typeface="Consolas" panose="020B0609020204030204" pitchFamily="49" charset="0"/>
               </a:rPr>
               <a:t>Execute a command in a running container</a:t>
+            </a:r>
+          </a:p>
+          <a:p>
+            <a:r>
+              <a:rPr lang="en-US" sz="3200" dirty="0">
+                <a:solidFill>
+                  <a:srgbClr val="FF0000"/>
+                </a:solidFill>
+                <a:latin typeface="Consolas" panose="020B0609020204030204" pitchFamily="49" charset="0"/>
+              </a:rPr>
+              <a:t>Docker cp: </a:t>
+            </a:r>
+            <a:r>
+              <a:rPr lang="en-US" sz="3200" dirty="0">
+                <a:solidFill>
+                  <a:srgbClr val="6A9955"/>
+                </a:solidFill>
+                <a:latin typeface="Consolas" panose="020B0609020204030204" pitchFamily="49" charset="0"/>
+              </a:rPr>
+              <a:t>Copy files to and from a container</a:t>
             </a:r>
           </a:p>
           <a:p>
@@ -29035,17 +29058,6 @@
               <a:buChar char="•"/>
             </a:pPr>
             <a:r>
-              <a:rPr lang="en-US" dirty="0" err="1"/>
-              <a:t>DbaChecks</a:t>
-            </a:r>
-            <a:endParaRPr lang="en-US" dirty="0"/>
-          </a:p>
-          <a:p>
-            <a:pPr marL="571500" indent="-571500">
-              <a:buFont typeface="Arial" panose="020B0604020202020204" pitchFamily="34" charset="0"/>
-              <a:buChar char="•"/>
-            </a:pPr>
-            <a:r>
               <a:rPr lang="en-US" dirty="0"/>
               <a:t>Security</a:t>
             </a:r>
@@ -29195,135 +29207,6 @@
           </a:fontRef>
         </p:style>
       </p:cxnSp>
-      <p:pic>
-        <p:nvPicPr>
-          <p:cNvPr id="16" name="Picture 4">
-            <a:extLst>
-              <a:ext uri="{FF2B5EF4-FFF2-40B4-BE49-F238E27FC236}">
-                <a16:creationId xmlns:a16="http://schemas.microsoft.com/office/drawing/2014/main" id="{967127AD-0773-4995-ACED-CCA1B213B1CD}"/>
-              </a:ext>
-            </a:extLst>
-          </p:cNvPr>
-          <p:cNvPicPr>
-            <a:picLocks noChangeAspect="1" noChangeArrowheads="1"/>
-          </p:cNvPicPr>
-          <p:nvPr/>
-        </p:nvPicPr>
-        <p:blipFill>
-          <a:blip r:embed="rId4">
-            <a:extLst>
-              <a:ext uri="{28A0092B-C50C-407E-A947-70E740481C1C}">
-                <a14:useLocalDpi xmlns:a14="http://schemas.microsoft.com/office/drawing/2010/main" val="0"/>
-              </a:ext>
-            </a:extLst>
-          </a:blip>
-          <a:srcRect/>
-          <a:stretch>
-            <a:fillRect/>
-          </a:stretch>
-        </p:blipFill>
-        <p:spPr bwMode="auto">
-          <a:xfrm>
-            <a:off x="6905442" y="3850624"/>
-            <a:ext cx="1790700" cy="1409700"/>
-          </a:xfrm>
-          <a:prstGeom prst="rect">
-            <a:avLst/>
-          </a:prstGeom>
-          <a:noFill/>
-          <a:extLst>
-            <a:ext uri="{909E8E84-426E-40DD-AFC4-6F175D3DCCD1}">
-              <a14:hiddenFill xmlns:a14="http://schemas.microsoft.com/office/drawing/2010/main">
-                <a:solidFill>
-                  <a:srgbClr val="FFFFFF"/>
-                </a:solidFill>
-              </a14:hiddenFill>
-            </a:ext>
-          </a:extLst>
-        </p:spPr>
-      </p:pic>
-      <p:sp>
-        <p:nvSpPr>
-          <p:cNvPr id="17" name="Rectangle 16">
-            <a:extLst>
-              <a:ext uri="{FF2B5EF4-FFF2-40B4-BE49-F238E27FC236}">
-                <a16:creationId xmlns:a16="http://schemas.microsoft.com/office/drawing/2014/main" id="{01E129B7-532A-4A87-B8E3-E29C1713158F}"/>
-              </a:ext>
-            </a:extLst>
-          </p:cNvPr>
-          <p:cNvSpPr/>
-          <p:nvPr/>
-        </p:nvSpPr>
-        <p:spPr>
-          <a:xfrm>
-            <a:off x="8594351" y="4369014"/>
-            <a:ext cx="2432397" cy="646331"/>
-          </a:xfrm>
-          <a:prstGeom prst="rect">
-            <a:avLst/>
-          </a:prstGeom>
-          <a:noFill/>
-          <a:ln>
-            <a:noFill/>
-          </a:ln>
-        </p:spPr>
-        <p:style>
-          <a:lnRef idx="0">
-            <a:scrgbClr r="0" g="0" b="0"/>
-          </a:lnRef>
-          <a:fillRef idx="0">
-            <a:scrgbClr r="0" g="0" b="0"/>
-          </a:fillRef>
-          <a:effectRef idx="0">
-            <a:scrgbClr r="0" g="0" b="0"/>
-          </a:effectRef>
-          <a:fontRef idx="minor">
-            <a:schemeClr val="accent5"/>
-          </a:fontRef>
-        </p:style>
-        <p:txBody>
-          <a:bodyPr wrap="none" lIns="91440" tIns="45720" rIns="91440" bIns="45720">
-            <a:spAutoFit/>
-          </a:bodyPr>
-          <a:lstStyle/>
-          <a:p>
-            <a:pPr algn="ctr"/>
-            <a:r>
-              <a:rPr lang="en-US" sz="3600" b="1" cap="none" spc="0" dirty="0" err="1">
-                <a:ln w="0"/>
-                <a:solidFill>
-                  <a:schemeClr val="accent5">
-                    <a:lumMod val="50000"/>
-                  </a:schemeClr>
-                </a:solidFill>
-                <a:effectLst>
-                  <a:outerShdw blurRad="38100" dist="19050" dir="2700000" algn="tl" rotWithShape="0">
-                    <a:schemeClr val="dk1">
-                      <a:alpha val="40000"/>
-                    </a:schemeClr>
-                  </a:outerShdw>
-                </a:effectLst>
-              </a:rPr>
-              <a:t>dbachecks</a:t>
-            </a:r>
-            <a:endParaRPr lang="en-US" sz="3600" b="1" cap="none" spc="0" dirty="0">
-              <a:ln w="0"/>
-              <a:solidFill>
-                <a:schemeClr val="accent5">
-                  <a:lumMod val="50000"/>
-                </a:schemeClr>
-              </a:solidFill>
-              <a:effectLst>
-                <a:outerShdw blurRad="38100" dist="19050" dir="2700000" algn="tl" rotWithShape="0">
-                  <a:schemeClr val="dk1">
-                    <a:alpha val="40000"/>
-                  </a:schemeClr>
-                </a:outerShdw>
-              </a:effectLst>
-            </a:endParaRPr>
-          </a:p>
-        </p:txBody>
-      </p:sp>
     </p:spTree>
     <p:extLst>
       <p:ext uri="{BB962C8B-B14F-4D97-AF65-F5344CB8AC3E}">
@@ -32496,7 +32379,7 @@
           <p:cNvPr id="2" name="Title 1">
             <a:extLst>
               <a:ext uri="{FF2B5EF4-FFF2-40B4-BE49-F238E27FC236}">
-                <a16:creationId xmlns:a16="http://schemas.microsoft.com/office/drawing/2014/main" id="{D1B6F6DD-94CA-4AD5-856E-14BD811F09AD}"/>
+                <a16:creationId xmlns:a16="http://schemas.microsoft.com/office/drawing/2014/main" id="{27A67401-095E-455F-93EC-A1639DBA9B30}"/>
               </a:ext>
             </a:extLst>
           </p:cNvPr>
@@ -32510,28 +32393,300 @@
         <p:spPr>
           <a:xfrm>
             <a:off x="838200" y="365126"/>
-            <a:ext cx="10515600" cy="649942"/>
+            <a:ext cx="10515600" cy="767388"/>
           </a:xfrm>
         </p:spPr>
         <p:txBody>
           <a:bodyPr>
-            <a:normAutofit fontScale="90000"/>
+            <a:normAutofit/>
           </a:bodyPr>
           <a:lstStyle/>
           <a:p>
             <a:r>
               <a:rPr lang="en-US" dirty="0"/>
-              <a:t>Database Testing</a:t>
-            </a:r>
+              <a:t>Docker Commands to Do Things</a:t>
+            </a:r>
+          </a:p>
+        </p:txBody>
+      </p:sp>
+      <p:sp>
+        <p:nvSpPr>
+          <p:cNvPr id="3" name="Rectangle 2">
+            <a:extLst>
+              <a:ext uri="{FF2B5EF4-FFF2-40B4-BE49-F238E27FC236}">
+                <a16:creationId xmlns:a16="http://schemas.microsoft.com/office/drawing/2014/main" id="{17A3620F-72A6-49A3-89E3-ACF02A67CE09}"/>
+              </a:ext>
+            </a:extLst>
+          </p:cNvPr>
+          <p:cNvSpPr/>
+          <p:nvPr/>
+        </p:nvSpPr>
+        <p:spPr>
+          <a:xfrm>
+            <a:off x="838199" y="1645920"/>
+            <a:ext cx="10515785" cy="3170099"/>
+          </a:xfrm>
+          <a:prstGeom prst="rect">
+            <a:avLst/>
+          </a:prstGeom>
+        </p:spPr>
+        <p:txBody>
+          <a:bodyPr wrap="square">
+            <a:spAutoFit/>
+          </a:bodyPr>
+          <a:lstStyle/>
+          <a:p>
+            <a:pPr marL="342900" indent="-342900">
+              <a:buFont typeface="Wingdings" panose="05000000000000000000" pitchFamily="2" charset="2"/>
+              <a:buChar char="Ø"/>
+            </a:pPr>
+            <a:r>
+              <a:rPr lang="fr-FR" sz="2000" b="0" dirty="0">
+                <a:solidFill>
+                  <a:srgbClr val="FF0000"/>
+                </a:solidFill>
+                <a:effectLst/>
+                <a:latin typeface="Consolas" panose="020B0609020204030204" pitchFamily="49" charset="0"/>
+              </a:rPr>
+              <a:t>docker run -p</a:t>
+            </a:r>
+            <a:r>
+              <a:rPr lang="fr-FR" sz="2000" b="0" dirty="0">
+                <a:effectLst/>
+                <a:latin typeface="Consolas" panose="020B0609020204030204" pitchFamily="49" charset="0"/>
+              </a:rPr>
+              <a:t> 1433:1433 </a:t>
+            </a:r>
+            <a:r>
+              <a:rPr lang="fr-FR" sz="2000" b="0" dirty="0">
+                <a:solidFill>
+                  <a:srgbClr val="FF0000"/>
+                </a:solidFill>
+                <a:effectLst/>
+                <a:latin typeface="Consolas" panose="020B0609020204030204" pitchFamily="49" charset="0"/>
+              </a:rPr>
+              <a:t>-e</a:t>
+            </a:r>
+            <a:r>
+              <a:rPr lang="fr-FR" sz="2000" b="0" dirty="0">
+                <a:effectLst/>
+                <a:latin typeface="Consolas" panose="020B0609020204030204" pitchFamily="49" charset="0"/>
+              </a:rPr>
+              <a:t> SA_PASSWORD=$password </a:t>
+            </a:r>
+            <a:r>
+              <a:rPr lang="fr-FR" sz="2000" b="0" dirty="0">
+                <a:solidFill>
+                  <a:srgbClr val="FF0000"/>
+                </a:solidFill>
+                <a:effectLst/>
+                <a:latin typeface="Consolas" panose="020B0609020204030204" pitchFamily="49" charset="0"/>
+              </a:rPr>
+              <a:t>-e</a:t>
+            </a:r>
+            <a:r>
+              <a:rPr lang="fr-FR" sz="2000" b="0" dirty="0">
+                <a:effectLst/>
+                <a:latin typeface="Consolas" panose="020B0609020204030204" pitchFamily="49" charset="0"/>
+              </a:rPr>
+              <a:t> ACCEPT_EULA=Y mcr.microsoft.com/mssql/server:2019-latest</a:t>
+            </a:r>
+          </a:p>
+          <a:p>
+            <a:pPr marL="342900" indent="-342900">
+              <a:buFont typeface="Wingdings" panose="05000000000000000000" pitchFamily="2" charset="2"/>
+              <a:buChar char="Ø"/>
+            </a:pPr>
+            <a:endParaRPr lang="en-US" sz="2000" dirty="0">
+              <a:solidFill>
+                <a:srgbClr val="FF0000"/>
+              </a:solidFill>
+              <a:latin typeface="Consolas" panose="020B0609020204030204" pitchFamily="49" charset="0"/>
+            </a:endParaRPr>
+          </a:p>
+          <a:p>
+            <a:pPr marL="342900" indent="-342900">
+              <a:buFont typeface="Wingdings" panose="05000000000000000000" pitchFamily="2" charset="2"/>
+              <a:buChar char="Ø"/>
+            </a:pPr>
+            <a:r>
+              <a:rPr lang="en-US" sz="2000" dirty="0">
+                <a:solidFill>
+                  <a:srgbClr val="FF0000"/>
+                </a:solidFill>
+                <a:latin typeface="Consolas" panose="020B0609020204030204" pitchFamily="49" charset="0"/>
+              </a:rPr>
+              <a:t>Docker exec –it </a:t>
+            </a:r>
+            <a:r>
+              <a:rPr lang="en-US" sz="2000" dirty="0" err="1">
+                <a:latin typeface="Consolas" panose="020B0609020204030204" pitchFamily="49" charset="0"/>
+              </a:rPr>
+              <a:t>aw_preprod</a:t>
+            </a:r>
+            <a:r>
+              <a:rPr lang="en-US" sz="2000" dirty="0">
+                <a:latin typeface="Consolas" panose="020B0609020204030204" pitchFamily="49" charset="0"/>
+              </a:rPr>
+              <a:t> </a:t>
+            </a:r>
+            <a:r>
+              <a:rPr lang="en-US" sz="2000" dirty="0" err="1">
+                <a:latin typeface="Consolas" panose="020B0609020204030204" pitchFamily="49" charset="0"/>
+              </a:rPr>
+              <a:t>mkdir</a:t>
+            </a:r>
+            <a:r>
+              <a:rPr lang="en-US" sz="2000" dirty="0">
+                <a:latin typeface="Consolas" panose="020B0609020204030204" pitchFamily="49" charset="0"/>
+              </a:rPr>
+              <a:t> /var/opt/</a:t>
+            </a:r>
+            <a:r>
+              <a:rPr lang="en-US" sz="2000" dirty="0" err="1">
+                <a:latin typeface="Consolas" panose="020B0609020204030204" pitchFamily="49" charset="0"/>
+              </a:rPr>
+              <a:t>mssql</a:t>
+            </a:r>
+            <a:r>
+              <a:rPr lang="en-US" sz="2000" dirty="0">
+                <a:latin typeface="Consolas" panose="020B0609020204030204" pitchFamily="49" charset="0"/>
+              </a:rPr>
+              <a:t>/backup</a:t>
+            </a:r>
+          </a:p>
+          <a:p>
+            <a:pPr marL="342900" indent="-342900">
+              <a:buFont typeface="Wingdings" panose="05000000000000000000" pitchFamily="2" charset="2"/>
+              <a:buChar char="Ø"/>
+            </a:pPr>
+            <a:endParaRPr lang="en-US" sz="2000" dirty="0">
+              <a:solidFill>
+                <a:srgbClr val="FF0000"/>
+              </a:solidFill>
+              <a:latin typeface="Consolas" panose="020B0609020204030204" pitchFamily="49" charset="0"/>
+            </a:endParaRPr>
+          </a:p>
+          <a:p>
+            <a:pPr marL="342900" indent="-342900">
+              <a:buFont typeface="Wingdings" panose="05000000000000000000" pitchFamily="2" charset="2"/>
+              <a:buChar char="Ø"/>
+            </a:pPr>
+            <a:r>
+              <a:rPr lang="en-US" sz="2000" dirty="0">
+                <a:solidFill>
+                  <a:srgbClr val="FF0000"/>
+                </a:solidFill>
+                <a:latin typeface="Consolas" panose="020B0609020204030204" pitchFamily="49" charset="0"/>
+              </a:rPr>
+              <a:t>Docker cp </a:t>
+            </a:r>
+            <a:r>
+              <a:rPr lang="en-US" sz="2000" dirty="0">
+                <a:latin typeface="Consolas" panose="020B0609020204030204" pitchFamily="49" charset="0"/>
+              </a:rPr>
+              <a:t>c:\backup\wwi.bak </a:t>
+            </a:r>
+            <a:r>
+              <a:rPr lang="en-US" sz="2000" dirty="0" err="1">
+                <a:latin typeface="Consolas" panose="020B0609020204030204" pitchFamily="49" charset="0"/>
+              </a:rPr>
+              <a:t>aw_preprod</a:t>
+            </a:r>
+            <a:r>
+              <a:rPr lang="en-US" sz="2000" dirty="0">
+                <a:latin typeface="Consolas" panose="020B0609020204030204" pitchFamily="49" charset="0"/>
+              </a:rPr>
+              <a:t>:/var/opt/</a:t>
+            </a:r>
+            <a:r>
+              <a:rPr lang="en-US" sz="2000" dirty="0" err="1">
+                <a:latin typeface="Consolas" panose="020B0609020204030204" pitchFamily="49" charset="0"/>
+              </a:rPr>
+              <a:t>mssql</a:t>
+            </a:r>
+            <a:r>
+              <a:rPr lang="en-US" sz="2000" dirty="0">
+                <a:latin typeface="Consolas" panose="020B0609020204030204" pitchFamily="49" charset="0"/>
+              </a:rPr>
+              <a:t>/backup</a:t>
+            </a:r>
+          </a:p>
+          <a:p>
+            <a:pPr marL="342900" indent="-342900">
+              <a:buFont typeface="Wingdings" panose="05000000000000000000" pitchFamily="2" charset="2"/>
+              <a:buChar char="Ø"/>
+            </a:pPr>
+            <a:endParaRPr lang="en-US" sz="2000" b="0" dirty="0">
+              <a:effectLst/>
+              <a:latin typeface="Consolas" panose="020B0609020204030204" pitchFamily="49" charset="0"/>
+            </a:endParaRPr>
+          </a:p>
+          <a:p>
+            <a:pPr marL="342900" indent="-342900">
+              <a:buFont typeface="Wingdings" panose="05000000000000000000" pitchFamily="2" charset="2"/>
+              <a:buChar char="Ø"/>
+            </a:pPr>
+            <a:r>
+              <a:rPr lang="en-US" sz="2000" b="0" dirty="0">
+                <a:solidFill>
+                  <a:srgbClr val="FF0000"/>
+                </a:solidFill>
+                <a:effectLst/>
+                <a:latin typeface="Consolas" panose="020B0609020204030204" pitchFamily="49" charset="0"/>
+              </a:rPr>
+              <a:t>docker exec -it</a:t>
+            </a:r>
+            <a:r>
+              <a:rPr lang="en-US" sz="2000" b="0" dirty="0">
+                <a:effectLst/>
+                <a:latin typeface="Consolas" panose="020B0609020204030204" pitchFamily="49" charset="0"/>
+              </a:rPr>
+              <a:t> </a:t>
+            </a:r>
+            <a:r>
+              <a:rPr lang="en-US" sz="2000" b="0" dirty="0" err="1">
+                <a:effectLst/>
+                <a:latin typeface="Consolas" panose="020B0609020204030204" pitchFamily="49" charset="0"/>
+              </a:rPr>
+              <a:t>aw_preprod</a:t>
+            </a:r>
+            <a:r>
+              <a:rPr lang="en-US" sz="2000" b="0" dirty="0">
+                <a:effectLst/>
+                <a:latin typeface="Consolas" panose="020B0609020204030204" pitchFamily="49" charset="0"/>
+              </a:rPr>
+              <a:t> /bin/bash</a:t>
+            </a:r>
+          </a:p>
+          <a:p>
+            <a:pPr marL="342900" indent="-342900">
+              <a:buFont typeface="Wingdings" panose="05000000000000000000" pitchFamily="2" charset="2"/>
+              <a:buChar char="Ø"/>
+            </a:pPr>
+            <a:endParaRPr lang="en-US" sz="2000" b="0" dirty="0">
+              <a:effectLst/>
+              <a:latin typeface="Consolas" panose="020B0609020204030204" pitchFamily="49" charset="0"/>
+            </a:endParaRPr>
+          </a:p>
+          <a:p>
+            <a:pPr marL="342900" indent="-342900">
+              <a:buFont typeface="Wingdings" panose="05000000000000000000" pitchFamily="2" charset="2"/>
+              <a:buChar char="Ø"/>
+            </a:pPr>
+            <a:endParaRPr lang="en-US" sz="2000" b="0" dirty="0">
+              <a:effectLst/>
+              <a:latin typeface="Consolas" panose="020B0609020204030204" pitchFamily="49" charset="0"/>
+            </a:endParaRPr>
           </a:p>
         </p:txBody>
       </p:sp>
       <p:cxnSp>
         <p:nvCxnSpPr>
-          <p:cNvPr id="3" name="Straight Connector 2">
-            <a:extLst>
-              <a:ext uri="{FF2B5EF4-FFF2-40B4-BE49-F238E27FC236}">
-                <a16:creationId xmlns:a16="http://schemas.microsoft.com/office/drawing/2014/main" id="{B52B4365-7ABA-4C3A-92A9-4DF4523C0BC1}"/>
+          <p:cNvPr id="4" name="Straight Connector 3">
+            <a:extLst>
+              <a:ext uri="{FF2B5EF4-FFF2-40B4-BE49-F238E27FC236}">
+                <a16:creationId xmlns:a16="http://schemas.microsoft.com/office/drawing/2014/main" id="{DE5AE2E5-AD0E-49F9-B10F-CBF12A7970EB}"/>
               </a:ext>
             </a:extLst>
           </p:cNvPr>
@@ -32565,186 +32720,10 @@
           </a:fontRef>
         </p:style>
       </p:cxnSp>
-      <p:sp>
-        <p:nvSpPr>
-          <p:cNvPr id="5" name="TextBox 4">
-            <a:extLst>
-              <a:ext uri="{FF2B5EF4-FFF2-40B4-BE49-F238E27FC236}">
-                <a16:creationId xmlns:a16="http://schemas.microsoft.com/office/drawing/2014/main" id="{7B81140E-E830-4575-9B07-68E208C54921}"/>
-              </a:ext>
-            </a:extLst>
-          </p:cNvPr>
-          <p:cNvSpPr txBox="1"/>
-          <p:nvPr/>
-        </p:nvSpPr>
-        <p:spPr>
-          <a:xfrm>
-            <a:off x="838200" y="1300294"/>
-            <a:ext cx="10515600" cy="2677656"/>
-          </a:xfrm>
-          <a:prstGeom prst="rect">
-            <a:avLst/>
-          </a:prstGeom>
-          <a:noFill/>
-        </p:spPr>
-        <p:txBody>
-          <a:bodyPr wrap="square">
-            <a:spAutoFit/>
-          </a:bodyPr>
-          <a:lstStyle/>
-          <a:p>
-            <a:pPr defTabSz="457200"/>
-            <a:r>
-              <a:rPr lang="en-US" sz="2400" dirty="0">
-                <a:latin typeface="Consolas" panose="020B0609020204030204" pitchFamily="49" charset="0"/>
-              </a:rPr>
-              <a:t>$Check = @{</a:t>
-            </a:r>
-          </a:p>
-          <a:p>
-            <a:pPr defTabSz="457200"/>
-            <a:r>
-              <a:rPr lang="en-US" sz="2400" dirty="0">
-                <a:latin typeface="Consolas" panose="020B0609020204030204" pitchFamily="49" charset="0"/>
-              </a:rPr>
-              <a:t>    "</a:t>
-            </a:r>
-            <a:r>
-              <a:rPr lang="en-US" sz="2400" dirty="0" err="1">
-                <a:latin typeface="Consolas" panose="020B0609020204030204" pitchFamily="49" charset="0"/>
-              </a:rPr>
-              <a:t>SqlInstance</a:t>
-            </a:r>
-            <a:r>
-              <a:rPr lang="en-US" sz="2400" dirty="0">
-                <a:latin typeface="Consolas" panose="020B0609020204030204" pitchFamily="49" charset="0"/>
-              </a:rPr>
-              <a:t>"=$</a:t>
-            </a:r>
-            <a:r>
-              <a:rPr lang="en-US" sz="2400" dirty="0" err="1">
-                <a:latin typeface="Consolas" panose="020B0609020204030204" pitchFamily="49" charset="0"/>
-              </a:rPr>
-              <a:t>HostName</a:t>
-            </a:r>
-            <a:r>
-              <a:rPr lang="en-US" sz="2400" dirty="0">
-                <a:latin typeface="Consolas" panose="020B0609020204030204" pitchFamily="49" charset="0"/>
-              </a:rPr>
-              <a:t> </a:t>
-            </a:r>
-          </a:p>
-          <a:p>
-            <a:pPr defTabSz="457200"/>
-            <a:r>
-              <a:rPr lang="en-US" sz="2400" dirty="0">
-                <a:latin typeface="Consolas" panose="020B0609020204030204" pitchFamily="49" charset="0"/>
-              </a:rPr>
-              <a:t>    "</a:t>
-            </a:r>
-            <a:r>
-              <a:rPr lang="en-US" sz="2400" dirty="0" err="1">
-                <a:latin typeface="Consolas" panose="020B0609020204030204" pitchFamily="49" charset="0"/>
-              </a:rPr>
-              <a:t>SqlCredential</a:t>
-            </a:r>
-            <a:r>
-              <a:rPr lang="en-US" sz="2400" dirty="0">
-                <a:latin typeface="Consolas" panose="020B0609020204030204" pitchFamily="49" charset="0"/>
-              </a:rPr>
-              <a:t>"=$</a:t>
-            </a:r>
-            <a:r>
-              <a:rPr lang="en-US" sz="2400" dirty="0" err="1">
-                <a:latin typeface="Consolas" panose="020B0609020204030204" pitchFamily="49" charset="0"/>
-              </a:rPr>
-              <a:t>mycred</a:t>
-            </a:r>
-            <a:r>
-              <a:rPr lang="en-US" sz="2400" dirty="0">
-                <a:latin typeface="Consolas" panose="020B0609020204030204" pitchFamily="49" charset="0"/>
-              </a:rPr>
-              <a:t> </a:t>
-            </a:r>
-          </a:p>
-          <a:p>
-            <a:pPr defTabSz="457200"/>
-            <a:r>
-              <a:rPr lang="en-US" sz="2400" dirty="0">
-                <a:latin typeface="Consolas" panose="020B0609020204030204" pitchFamily="49" charset="0"/>
-              </a:rPr>
-              <a:t>    "Tags"="</a:t>
-            </a:r>
-            <a:r>
-              <a:rPr lang="en-US" sz="2400" dirty="0" err="1">
-                <a:latin typeface="Consolas" panose="020B0609020204030204" pitchFamily="49" charset="0"/>
-              </a:rPr>
-              <a:t>InstanceConnection</a:t>
-            </a:r>
-            <a:r>
-              <a:rPr lang="en-US" sz="2400" dirty="0">
-                <a:latin typeface="Consolas" panose="020B0609020204030204" pitchFamily="49" charset="0"/>
-              </a:rPr>
-              <a:t>" </a:t>
-            </a:r>
-          </a:p>
-          <a:p>
-            <a:pPr defTabSz="457200"/>
-            <a:r>
-              <a:rPr lang="en-US" sz="2400" dirty="0">
-                <a:latin typeface="Consolas" panose="020B0609020204030204" pitchFamily="49" charset="0"/>
-              </a:rPr>
-              <a:t>}</a:t>
-            </a:r>
-          </a:p>
-          <a:p>
-            <a:pPr defTabSz="457200"/>
-            <a:r>
-              <a:rPr lang="en-US" sz="2400" dirty="0">
-                <a:latin typeface="Consolas" panose="020B0609020204030204" pitchFamily="49" charset="0"/>
-              </a:rPr>
-              <a:t>Invoke-</a:t>
-            </a:r>
-            <a:r>
-              <a:rPr lang="en-US" sz="2400" dirty="0" err="1">
-                <a:latin typeface="Consolas" panose="020B0609020204030204" pitchFamily="49" charset="0"/>
-              </a:rPr>
-              <a:t>DbcCheck</a:t>
-            </a:r>
-            <a:r>
-              <a:rPr lang="en-US" sz="2400" dirty="0">
-                <a:latin typeface="Consolas" panose="020B0609020204030204" pitchFamily="49" charset="0"/>
-              </a:rPr>
-              <a:t> @Check -</a:t>
-            </a:r>
-            <a:r>
-              <a:rPr lang="en-US" sz="2400" dirty="0" err="1">
-                <a:latin typeface="Consolas" panose="020B0609020204030204" pitchFamily="49" charset="0"/>
-              </a:rPr>
-              <a:t>PassThru</a:t>
-            </a:r>
-            <a:r>
-              <a:rPr lang="en-US" sz="2400" dirty="0">
-                <a:latin typeface="Consolas" panose="020B0609020204030204" pitchFamily="49" charset="0"/>
-              </a:rPr>
-              <a:t> | Update-</a:t>
-            </a:r>
-            <a:r>
-              <a:rPr lang="en-US" sz="2400" dirty="0" err="1">
-                <a:latin typeface="Consolas" panose="020B0609020204030204" pitchFamily="49" charset="0"/>
-              </a:rPr>
-              <a:t>DbcPowerBiDataSource</a:t>
-            </a:r>
-            <a:endParaRPr lang="en-US" sz="2400" dirty="0">
-              <a:latin typeface="Consolas" panose="020B0609020204030204" pitchFamily="49" charset="0"/>
-            </a:endParaRPr>
-          </a:p>
-        </p:txBody>
-      </p:sp>
     </p:spTree>
     <p:extLst>
       <p:ext uri="{BB962C8B-B14F-4D97-AF65-F5344CB8AC3E}">
-        <p14:creationId xmlns:p14="http://schemas.microsoft.com/office/powerpoint/2010/main" val="356108062"/>
+        <p14:creationId xmlns:p14="http://schemas.microsoft.com/office/powerpoint/2010/main" val="1560803156"/>
       </p:ext>
     </p:extLst>
   </p:cSld>
@@ -32755,6 +32734,1689 @@
 </file>
 
 <file path=ppt/slides/slide32.xml><?xml version="1.0" encoding="utf-8"?>
+<p:sld xmlns:a="http://schemas.openxmlformats.org/drawingml/2006/main" xmlns:r="http://schemas.openxmlformats.org/officeDocument/2006/relationships" xmlns:p="http://schemas.openxmlformats.org/presentationml/2006/main">
+  <p:cSld>
+    <p:spTree>
+      <p:nvGrpSpPr>
+        <p:cNvPr id="1" name=""/>
+        <p:cNvGrpSpPr/>
+        <p:nvPr/>
+      </p:nvGrpSpPr>
+      <p:grpSpPr>
+        <a:xfrm>
+          <a:off x="0" y="0"/>
+          <a:ext cx="0" cy="0"/>
+          <a:chOff x="0" y="0"/>
+          <a:chExt cx="0" cy="0"/>
+        </a:xfrm>
+      </p:grpSpPr>
+      <p:sp>
+        <p:nvSpPr>
+          <p:cNvPr id="2" name="Title 1">
+            <a:extLst>
+              <a:ext uri="{FF2B5EF4-FFF2-40B4-BE49-F238E27FC236}">
+                <a16:creationId xmlns:a16="http://schemas.microsoft.com/office/drawing/2014/main" id="{27A67401-095E-455F-93EC-A1639DBA9B30}"/>
+              </a:ext>
+            </a:extLst>
+          </p:cNvPr>
+          <p:cNvSpPr>
+            <a:spLocks noGrp="1"/>
+          </p:cNvSpPr>
+          <p:nvPr>
+            <p:ph type="title"/>
+          </p:nvPr>
+        </p:nvSpPr>
+        <p:spPr>
+          <a:xfrm>
+            <a:off x="838200" y="365126"/>
+            <a:ext cx="10515600" cy="767388"/>
+          </a:xfrm>
+        </p:spPr>
+        <p:txBody>
+          <a:bodyPr>
+            <a:normAutofit/>
+          </a:bodyPr>
+          <a:lstStyle/>
+          <a:p>
+            <a:r>
+              <a:rPr lang="en-US" dirty="0"/>
+              <a:t>Powershell Commands to Do Things</a:t>
+            </a:r>
+          </a:p>
+        </p:txBody>
+      </p:sp>
+      <p:sp>
+        <p:nvSpPr>
+          <p:cNvPr id="3" name="Rectangle 2">
+            <a:extLst>
+              <a:ext uri="{FF2B5EF4-FFF2-40B4-BE49-F238E27FC236}">
+                <a16:creationId xmlns:a16="http://schemas.microsoft.com/office/drawing/2014/main" id="{17A3620F-72A6-49A3-89E3-ACF02A67CE09}"/>
+              </a:ext>
+            </a:extLst>
+          </p:cNvPr>
+          <p:cNvSpPr/>
+          <p:nvPr/>
+        </p:nvSpPr>
+        <p:spPr>
+          <a:xfrm>
+            <a:off x="838199" y="1645920"/>
+            <a:ext cx="10515785" cy="2246769"/>
+          </a:xfrm>
+          <a:prstGeom prst="rect">
+            <a:avLst/>
+          </a:prstGeom>
+        </p:spPr>
+        <p:txBody>
+          <a:bodyPr wrap="square">
+            <a:spAutoFit/>
+          </a:bodyPr>
+          <a:lstStyle/>
+          <a:p>
+            <a:pPr marL="342900" indent="-342900">
+              <a:buFont typeface="Wingdings" panose="05000000000000000000" pitchFamily="2" charset="2"/>
+              <a:buChar char="Ø"/>
+            </a:pPr>
+            <a:r>
+              <a:rPr lang="en-US" sz="2000" b="0" dirty="0">
+                <a:solidFill>
+                  <a:srgbClr val="FF0000"/>
+                </a:solidFill>
+                <a:effectLst/>
+                <a:latin typeface="Consolas" panose="020B0609020204030204" pitchFamily="49" charset="0"/>
+              </a:rPr>
+              <a:t>Invoke-</a:t>
+            </a:r>
+            <a:r>
+              <a:rPr lang="en-US" sz="2000" b="0" dirty="0" err="1">
+                <a:solidFill>
+                  <a:srgbClr val="FF0000"/>
+                </a:solidFill>
+                <a:effectLst/>
+                <a:latin typeface="Consolas" panose="020B0609020204030204" pitchFamily="49" charset="0"/>
+              </a:rPr>
+              <a:t>Sqlcmd</a:t>
+            </a:r>
+            <a:r>
+              <a:rPr lang="en-US" sz="2000" b="0" dirty="0">
+                <a:effectLst/>
+                <a:latin typeface="Consolas" panose="020B0609020204030204" pitchFamily="49" charset="0"/>
+              </a:rPr>
+              <a:t> </a:t>
+            </a:r>
+            <a:r>
+              <a:rPr lang="en-US" sz="2000" b="0" dirty="0">
+                <a:solidFill>
+                  <a:srgbClr val="FF0000"/>
+                </a:solidFill>
+                <a:effectLst/>
+                <a:latin typeface="Consolas" panose="020B0609020204030204" pitchFamily="49" charset="0"/>
+              </a:rPr>
+              <a:t>-</a:t>
+            </a:r>
+            <a:r>
+              <a:rPr lang="en-US" sz="2000" b="0" dirty="0" err="1">
+                <a:solidFill>
+                  <a:srgbClr val="FF0000"/>
+                </a:solidFill>
+                <a:effectLst/>
+                <a:latin typeface="Consolas" panose="020B0609020204030204" pitchFamily="49" charset="0"/>
+              </a:rPr>
+              <a:t>ServerInstance</a:t>
+            </a:r>
+            <a:r>
+              <a:rPr lang="en-US" sz="2000" b="0" dirty="0">
+                <a:solidFill>
+                  <a:srgbClr val="FF0000"/>
+                </a:solidFill>
+                <a:effectLst/>
+                <a:latin typeface="Consolas" panose="020B0609020204030204" pitchFamily="49" charset="0"/>
+              </a:rPr>
+              <a:t> </a:t>
+            </a:r>
+            <a:r>
+              <a:rPr lang="en-US" sz="2000" b="0" dirty="0">
+                <a:effectLst/>
+                <a:latin typeface="Consolas" panose="020B0609020204030204" pitchFamily="49" charset="0"/>
+              </a:rPr>
+              <a:t>localhost </a:t>
+            </a:r>
+            <a:r>
+              <a:rPr lang="en-US" sz="2000" b="0" dirty="0">
+                <a:solidFill>
+                  <a:srgbClr val="FF0000"/>
+                </a:solidFill>
+                <a:effectLst/>
+                <a:latin typeface="Consolas" panose="020B0609020204030204" pitchFamily="49" charset="0"/>
+              </a:rPr>
+              <a:t>-Username </a:t>
+            </a:r>
+            <a:r>
+              <a:rPr lang="en-US" sz="2000" b="0" dirty="0" err="1">
+                <a:effectLst/>
+                <a:latin typeface="Consolas" panose="020B0609020204030204" pitchFamily="49" charset="0"/>
+              </a:rPr>
+              <a:t>sa</a:t>
+            </a:r>
+            <a:r>
+              <a:rPr lang="en-US" sz="2000" b="0" dirty="0">
+                <a:effectLst/>
+                <a:latin typeface="Consolas" panose="020B0609020204030204" pitchFamily="49" charset="0"/>
+              </a:rPr>
+              <a:t> </a:t>
+            </a:r>
+            <a:r>
+              <a:rPr lang="en-US" sz="2000" b="0" dirty="0">
+                <a:solidFill>
+                  <a:srgbClr val="FF0000"/>
+                </a:solidFill>
+                <a:effectLst/>
+                <a:latin typeface="Consolas" panose="020B0609020204030204" pitchFamily="49" charset="0"/>
+              </a:rPr>
+              <a:t>-Password </a:t>
+            </a:r>
+            <a:r>
+              <a:rPr lang="en-US" sz="2000" b="0" dirty="0">
+                <a:effectLst/>
+                <a:latin typeface="Consolas" panose="020B0609020204030204" pitchFamily="49" charset="0"/>
+              </a:rPr>
+              <a:t>$password </a:t>
+            </a:r>
+            <a:r>
+              <a:rPr lang="en-US" sz="2000" b="0" dirty="0">
+                <a:solidFill>
+                  <a:srgbClr val="FF0000"/>
+                </a:solidFill>
+                <a:effectLst/>
+                <a:latin typeface="Consolas" panose="020B0609020204030204" pitchFamily="49" charset="0"/>
+              </a:rPr>
+              <a:t>-Query </a:t>
+            </a:r>
+            <a:r>
+              <a:rPr lang="en-US" sz="2000" b="0" dirty="0">
+                <a:effectLst/>
+                <a:latin typeface="Consolas" panose="020B0609020204030204" pitchFamily="49" charset="0"/>
+              </a:rPr>
+              <a:t>"SELECT @@ServerName as </a:t>
+            </a:r>
+            <a:r>
+              <a:rPr lang="en-US" sz="2000" b="0" dirty="0" err="1">
+                <a:effectLst/>
+                <a:latin typeface="Consolas" panose="020B0609020204030204" pitchFamily="49" charset="0"/>
+              </a:rPr>
+              <a:t>ServerName</a:t>
+            </a:r>
+            <a:r>
+              <a:rPr lang="en-US" sz="2000" b="0" dirty="0">
+                <a:effectLst/>
+                <a:latin typeface="Consolas" panose="020B0609020204030204" pitchFamily="49" charset="0"/>
+              </a:rPr>
+              <a:t>“</a:t>
+            </a:r>
+          </a:p>
+          <a:p>
+            <a:pPr marL="342900" indent="-342900">
+              <a:buFont typeface="Wingdings" panose="05000000000000000000" pitchFamily="2" charset="2"/>
+              <a:buChar char="Ø"/>
+            </a:pPr>
+            <a:endParaRPr lang="en-US" sz="2000" b="0" dirty="0">
+              <a:solidFill>
+                <a:srgbClr val="FF0000"/>
+              </a:solidFill>
+              <a:effectLst/>
+              <a:latin typeface="Consolas" panose="020B0609020204030204" pitchFamily="49" charset="0"/>
+            </a:endParaRPr>
+          </a:p>
+          <a:p>
+            <a:pPr marL="342900" indent="-342900">
+              <a:buFont typeface="Wingdings" panose="05000000000000000000" pitchFamily="2" charset="2"/>
+              <a:buChar char="Ø"/>
+            </a:pPr>
+            <a:r>
+              <a:rPr lang="en-US" sz="2000" b="0" dirty="0">
+                <a:solidFill>
+                  <a:srgbClr val="FF0000"/>
+                </a:solidFill>
+                <a:effectLst/>
+                <a:latin typeface="Consolas" panose="020B0609020204030204" pitchFamily="49" charset="0"/>
+              </a:rPr>
+              <a:t>Restore-</a:t>
+            </a:r>
+            <a:r>
+              <a:rPr lang="en-US" sz="2000" b="0" dirty="0" err="1">
+                <a:solidFill>
+                  <a:srgbClr val="FF0000"/>
+                </a:solidFill>
+                <a:effectLst/>
+                <a:latin typeface="Consolas" panose="020B0609020204030204" pitchFamily="49" charset="0"/>
+              </a:rPr>
+              <a:t>DbaDatabase</a:t>
+            </a:r>
+            <a:r>
+              <a:rPr lang="en-US" sz="2000" b="0" dirty="0">
+                <a:solidFill>
+                  <a:srgbClr val="FF0000"/>
+                </a:solidFill>
+                <a:effectLst/>
+                <a:latin typeface="Consolas" panose="020B0609020204030204" pitchFamily="49" charset="0"/>
+              </a:rPr>
+              <a:t> -</a:t>
+            </a:r>
+            <a:r>
+              <a:rPr lang="en-US" sz="2000" b="0" dirty="0" err="1">
+                <a:solidFill>
+                  <a:srgbClr val="FF0000"/>
+                </a:solidFill>
+                <a:effectLst/>
+                <a:latin typeface="Consolas" panose="020B0609020204030204" pitchFamily="49" charset="0"/>
+              </a:rPr>
+              <a:t>SqlInstance</a:t>
+            </a:r>
+            <a:r>
+              <a:rPr lang="en-US" sz="2000" b="0" dirty="0">
+                <a:solidFill>
+                  <a:srgbClr val="FF0000"/>
+                </a:solidFill>
+                <a:effectLst/>
+                <a:latin typeface="Consolas" panose="020B0609020204030204" pitchFamily="49" charset="0"/>
+              </a:rPr>
+              <a:t> </a:t>
+            </a:r>
+            <a:r>
+              <a:rPr lang="en-US" sz="2000" b="0" dirty="0">
+                <a:effectLst/>
+                <a:latin typeface="Consolas" panose="020B0609020204030204" pitchFamily="49" charset="0"/>
+              </a:rPr>
+              <a:t>localhost </a:t>
+            </a:r>
+            <a:r>
+              <a:rPr lang="en-US" sz="2000" b="0" dirty="0">
+                <a:solidFill>
+                  <a:srgbClr val="FF0000"/>
+                </a:solidFill>
+                <a:effectLst/>
+                <a:latin typeface="Consolas" panose="020B0609020204030204" pitchFamily="49" charset="0"/>
+              </a:rPr>
+              <a:t>-</a:t>
+            </a:r>
+            <a:r>
+              <a:rPr lang="en-US" sz="2000" b="0" dirty="0" err="1">
+                <a:solidFill>
+                  <a:srgbClr val="FF0000"/>
+                </a:solidFill>
+                <a:effectLst/>
+                <a:latin typeface="Consolas" panose="020B0609020204030204" pitchFamily="49" charset="0"/>
+              </a:rPr>
+              <a:t>SqlCredential</a:t>
+            </a:r>
+            <a:r>
+              <a:rPr lang="en-US" sz="2000" b="0" dirty="0">
+                <a:solidFill>
+                  <a:srgbClr val="FF0000"/>
+                </a:solidFill>
+                <a:effectLst/>
+                <a:latin typeface="Consolas" panose="020B0609020204030204" pitchFamily="49" charset="0"/>
+              </a:rPr>
+              <a:t> </a:t>
+            </a:r>
+            <a:r>
+              <a:rPr lang="en-US" sz="2000" b="0" dirty="0">
+                <a:solidFill>
+                  <a:schemeClr val="accent6"/>
+                </a:solidFill>
+                <a:effectLst/>
+                <a:latin typeface="Consolas" panose="020B0609020204030204" pitchFamily="49" charset="0"/>
+              </a:rPr>
+              <a:t>$</a:t>
+            </a:r>
+            <a:r>
+              <a:rPr lang="en-US" sz="2000" b="0" dirty="0" err="1">
+                <a:solidFill>
+                  <a:schemeClr val="accent6"/>
+                </a:solidFill>
+                <a:effectLst/>
+                <a:latin typeface="Consolas" panose="020B0609020204030204" pitchFamily="49" charset="0"/>
+              </a:rPr>
+              <a:t>mycred</a:t>
+            </a:r>
+            <a:r>
+              <a:rPr lang="en-US" sz="2000" b="0" dirty="0">
+                <a:solidFill>
+                  <a:schemeClr val="accent6"/>
+                </a:solidFill>
+                <a:effectLst/>
+                <a:latin typeface="Consolas" panose="020B0609020204030204" pitchFamily="49" charset="0"/>
+              </a:rPr>
+              <a:t> </a:t>
+            </a:r>
+            <a:r>
+              <a:rPr lang="en-US" sz="2000" b="0" dirty="0">
+                <a:solidFill>
+                  <a:srgbClr val="FF0000"/>
+                </a:solidFill>
+                <a:effectLst/>
+                <a:latin typeface="Consolas" panose="020B0609020204030204" pitchFamily="49" charset="0"/>
+              </a:rPr>
+              <a:t>-Path </a:t>
+            </a:r>
+            <a:r>
+              <a:rPr lang="en-US" sz="2000" b="0" dirty="0">
+                <a:effectLst/>
+                <a:latin typeface="Consolas" panose="020B0609020204030204" pitchFamily="49" charset="0"/>
+              </a:rPr>
+              <a:t>/var/opt/</a:t>
+            </a:r>
+            <a:r>
+              <a:rPr lang="en-US" sz="2000" b="0" dirty="0" err="1">
+                <a:effectLst/>
+                <a:latin typeface="Consolas" panose="020B0609020204030204" pitchFamily="49" charset="0"/>
+              </a:rPr>
+              <a:t>mssql</a:t>
+            </a:r>
+            <a:r>
+              <a:rPr lang="en-US" sz="2000" b="0" dirty="0">
+                <a:effectLst/>
+                <a:latin typeface="Consolas" panose="020B0609020204030204" pitchFamily="49" charset="0"/>
+              </a:rPr>
+              <a:t>/backup/</a:t>
+            </a:r>
+            <a:r>
+              <a:rPr lang="en-US" sz="2000" b="0" dirty="0" err="1">
+                <a:effectLst/>
+                <a:latin typeface="Consolas" panose="020B0609020204030204" pitchFamily="49" charset="0"/>
+              </a:rPr>
+              <a:t>WideWorldImporters-Full.bak</a:t>
+            </a:r>
+            <a:r>
+              <a:rPr lang="en-US" sz="2000" b="0" dirty="0">
+                <a:effectLst/>
+                <a:latin typeface="Consolas" panose="020B0609020204030204" pitchFamily="49" charset="0"/>
+              </a:rPr>
+              <a:t> </a:t>
+            </a:r>
+            <a:r>
+              <a:rPr lang="en-US" sz="2000" b="0" dirty="0">
+                <a:solidFill>
+                  <a:srgbClr val="FF0000"/>
+                </a:solidFill>
+                <a:effectLst/>
+                <a:latin typeface="Consolas" panose="020B0609020204030204" pitchFamily="49" charset="0"/>
+              </a:rPr>
+              <a:t>-</a:t>
+            </a:r>
+            <a:r>
+              <a:rPr lang="en-US" sz="2000" b="0" dirty="0" err="1">
+                <a:solidFill>
+                  <a:srgbClr val="FF0000"/>
+                </a:solidFill>
+                <a:effectLst/>
+                <a:latin typeface="Consolas" panose="020B0609020204030204" pitchFamily="49" charset="0"/>
+              </a:rPr>
+              <a:t>DatabaseName</a:t>
+            </a:r>
+            <a:r>
+              <a:rPr lang="en-US" sz="2000" b="0" dirty="0">
+                <a:solidFill>
+                  <a:srgbClr val="FF0000"/>
+                </a:solidFill>
+                <a:effectLst/>
+                <a:latin typeface="Consolas" panose="020B0609020204030204" pitchFamily="49" charset="0"/>
+              </a:rPr>
+              <a:t> </a:t>
+            </a:r>
+            <a:r>
+              <a:rPr lang="en-US" sz="2000" b="0" dirty="0">
+                <a:effectLst/>
+                <a:latin typeface="Consolas" panose="020B0609020204030204" pitchFamily="49" charset="0"/>
+              </a:rPr>
+              <a:t>WWI</a:t>
+            </a:r>
+          </a:p>
+          <a:p>
+            <a:endParaRPr lang="en-US" sz="2000" b="0" dirty="0">
+              <a:effectLst/>
+              <a:latin typeface="Consolas" panose="020B0609020204030204" pitchFamily="49" charset="0"/>
+            </a:endParaRPr>
+          </a:p>
+          <a:p>
+            <a:pPr marL="342900" indent="-342900">
+              <a:buFont typeface="Wingdings" panose="05000000000000000000" pitchFamily="2" charset="2"/>
+              <a:buChar char="Ø"/>
+            </a:pPr>
+            <a:endParaRPr lang="en-US" sz="2000" b="0" dirty="0">
+              <a:effectLst/>
+              <a:latin typeface="Consolas" panose="020B0609020204030204" pitchFamily="49" charset="0"/>
+            </a:endParaRPr>
+          </a:p>
+        </p:txBody>
+      </p:sp>
+      <p:cxnSp>
+        <p:nvCxnSpPr>
+          <p:cNvPr id="4" name="Straight Connector 3">
+            <a:extLst>
+              <a:ext uri="{FF2B5EF4-FFF2-40B4-BE49-F238E27FC236}">
+                <a16:creationId xmlns:a16="http://schemas.microsoft.com/office/drawing/2014/main" id="{DE5AE2E5-AD0E-49F9-B10F-CBF12A7970EB}"/>
+              </a:ext>
+            </a:extLst>
+          </p:cNvPr>
+          <p:cNvCxnSpPr>
+            <a:cxnSpLocks/>
+          </p:cNvCxnSpPr>
+          <p:nvPr/>
+        </p:nvCxnSpPr>
+        <p:spPr>
+          <a:xfrm>
+            <a:off x="838200" y="1015068"/>
+            <a:ext cx="10515600" cy="0"/>
+          </a:xfrm>
+          <a:prstGeom prst="line">
+            <a:avLst/>
+          </a:prstGeom>
+          <a:ln w="12700"/>
+        </p:spPr>
+        <p:style>
+          <a:lnRef idx="1">
+            <a:schemeClr val="dk1"/>
+          </a:lnRef>
+          <a:fillRef idx="0">
+            <a:schemeClr val="dk1"/>
+          </a:fillRef>
+          <a:effectRef idx="0">
+            <a:schemeClr val="dk1"/>
+          </a:effectRef>
+          <a:fontRef idx="minor">
+            <a:schemeClr val="tx1"/>
+          </a:fontRef>
+        </p:style>
+      </p:cxnSp>
+    </p:spTree>
+    <p:extLst>
+      <p:ext uri="{BB962C8B-B14F-4D97-AF65-F5344CB8AC3E}">
+        <p14:creationId xmlns:p14="http://schemas.microsoft.com/office/powerpoint/2010/main" val="2916639046"/>
+      </p:ext>
+    </p:extLst>
+  </p:cSld>
+  <p:clrMapOvr>
+    <a:masterClrMapping/>
+  </p:clrMapOvr>
+</p:sld>
+</file>
+
+<file path=ppt/slides/slide33.xml><?xml version="1.0" encoding="utf-8"?>
+<p:sld xmlns:a="http://schemas.openxmlformats.org/drawingml/2006/main" xmlns:r="http://schemas.openxmlformats.org/officeDocument/2006/relationships" xmlns:p="http://schemas.openxmlformats.org/presentationml/2006/main">
+  <p:cSld>
+    <p:spTree>
+      <p:nvGrpSpPr>
+        <p:cNvPr id="1" name=""/>
+        <p:cNvGrpSpPr/>
+        <p:nvPr/>
+      </p:nvGrpSpPr>
+      <p:grpSpPr>
+        <a:xfrm>
+          <a:off x="0" y="0"/>
+          <a:ext cx="0" cy="0"/>
+          <a:chOff x="0" y="0"/>
+          <a:chExt cx="0" cy="0"/>
+        </a:xfrm>
+      </p:grpSpPr>
+      <p:sp>
+        <p:nvSpPr>
+          <p:cNvPr id="2" name="Title 1">
+            <a:extLst>
+              <a:ext uri="{FF2B5EF4-FFF2-40B4-BE49-F238E27FC236}">
+                <a16:creationId xmlns:a16="http://schemas.microsoft.com/office/drawing/2014/main" id="{A95E5599-0966-4198-BE1F-571420A2A29F}"/>
+              </a:ext>
+            </a:extLst>
+          </p:cNvPr>
+          <p:cNvSpPr>
+            <a:spLocks noGrp="1"/>
+          </p:cNvSpPr>
+          <p:nvPr>
+            <p:ph type="title"/>
+          </p:nvPr>
+        </p:nvSpPr>
+        <p:spPr/>
+        <p:txBody>
+          <a:bodyPr/>
+          <a:lstStyle/>
+          <a:p>
+            <a:r>
+              <a:rPr lang="en-US" dirty="0"/>
+              <a:t>Create Container and restore DB</a:t>
+            </a:r>
+          </a:p>
+        </p:txBody>
+      </p:sp>
+      <p:sp>
+        <p:nvSpPr>
+          <p:cNvPr id="3" name="Content Placeholder 2">
+            <a:extLst>
+              <a:ext uri="{FF2B5EF4-FFF2-40B4-BE49-F238E27FC236}">
+                <a16:creationId xmlns:a16="http://schemas.microsoft.com/office/drawing/2014/main" id="{68AB9713-DA56-4099-830B-EE8491EBC97C}"/>
+              </a:ext>
+            </a:extLst>
+          </p:cNvPr>
+          <p:cNvSpPr>
+            <a:spLocks noGrp="1"/>
+          </p:cNvSpPr>
+          <p:nvPr>
+            <p:ph sz="half" idx="1"/>
+          </p:nvPr>
+        </p:nvSpPr>
+        <p:spPr>
+          <a:xfrm>
+            <a:off x="427839" y="1825625"/>
+            <a:ext cx="5838737" cy="3906435"/>
+          </a:xfrm>
+        </p:spPr>
+        <p:txBody>
+          <a:bodyPr>
+            <a:normAutofit fontScale="62500" lnSpcReduction="20000"/>
+          </a:bodyPr>
+          <a:lstStyle/>
+          <a:p>
+            <a:pPr marL="0" indent="0">
+              <a:buNone/>
+            </a:pPr>
+            <a:r>
+              <a:rPr lang="en-US" b="0" dirty="0">
+                <a:solidFill>
+                  <a:srgbClr val="FF0000"/>
+                </a:solidFill>
+                <a:effectLst/>
+                <a:latin typeface="Consolas" panose="020B0609020204030204" pitchFamily="49" charset="0"/>
+              </a:rPr>
+              <a:t>docker run</a:t>
+            </a:r>
+            <a:r>
+              <a:rPr lang="en-US" b="0" dirty="0">
+                <a:effectLst/>
+                <a:latin typeface="Consolas" panose="020B0609020204030204" pitchFamily="49" charset="0"/>
+              </a:rPr>
+              <a:t> -d `</a:t>
+            </a:r>
+          </a:p>
+          <a:p>
+            <a:pPr marL="0" indent="0">
+              <a:buNone/>
+            </a:pPr>
+            <a:r>
+              <a:rPr lang="en-US" b="0" dirty="0">
+                <a:effectLst/>
+                <a:latin typeface="Consolas" panose="020B0609020204030204" pitchFamily="49" charset="0"/>
+              </a:rPr>
+              <a:t> -p </a:t>
+            </a:r>
+            <a:r>
+              <a:rPr lang="en-US" b="0" dirty="0">
+                <a:solidFill>
+                  <a:schemeClr val="accent1"/>
+                </a:solidFill>
+                <a:effectLst/>
+                <a:latin typeface="Consolas" panose="020B0609020204030204" pitchFamily="49" charset="0"/>
+              </a:rPr>
+              <a:t>1433:1433</a:t>
+            </a:r>
+            <a:r>
+              <a:rPr lang="en-US" b="0" dirty="0">
+                <a:effectLst/>
+                <a:latin typeface="Consolas" panose="020B0609020204030204" pitchFamily="49" charset="0"/>
+              </a:rPr>
+              <a:t> `</a:t>
+            </a:r>
+          </a:p>
+          <a:p>
+            <a:pPr marL="0" indent="0">
+              <a:buNone/>
+            </a:pPr>
+            <a:r>
+              <a:rPr lang="en-US" b="0" dirty="0">
+                <a:effectLst/>
+                <a:latin typeface="Consolas" panose="020B0609020204030204" pitchFamily="49" charset="0"/>
+              </a:rPr>
+              <a:t> --name </a:t>
+            </a:r>
+            <a:r>
+              <a:rPr lang="en-US" b="0" dirty="0" err="1">
+                <a:solidFill>
+                  <a:schemeClr val="accent1"/>
+                </a:solidFill>
+                <a:effectLst/>
+                <a:latin typeface="Consolas" panose="020B0609020204030204" pitchFamily="49" charset="0"/>
+              </a:rPr>
+              <a:t>aw_preprod</a:t>
+            </a:r>
+            <a:r>
+              <a:rPr lang="en-US" b="0" dirty="0">
+                <a:effectLst/>
+                <a:latin typeface="Consolas" panose="020B0609020204030204" pitchFamily="49" charset="0"/>
+              </a:rPr>
+              <a:t> `</a:t>
+            </a:r>
+          </a:p>
+          <a:p>
+            <a:pPr marL="0" indent="0">
+              <a:buNone/>
+            </a:pPr>
+            <a:r>
+              <a:rPr lang="en-US" b="0" dirty="0">
+                <a:effectLst/>
+                <a:latin typeface="Consolas" panose="020B0609020204030204" pitchFamily="49" charset="0"/>
+              </a:rPr>
+              <a:t> --hostname </a:t>
+            </a:r>
+            <a:r>
+              <a:rPr lang="en-US" b="0" dirty="0" err="1">
+                <a:solidFill>
+                  <a:schemeClr val="accent1"/>
+                </a:solidFill>
+                <a:effectLst/>
+                <a:latin typeface="Consolas" panose="020B0609020204030204" pitchFamily="49" charset="0"/>
+              </a:rPr>
+              <a:t>aw_preprod</a:t>
+            </a:r>
+            <a:r>
+              <a:rPr lang="en-US" b="0" dirty="0">
+                <a:effectLst/>
+                <a:latin typeface="Consolas" panose="020B0609020204030204" pitchFamily="49" charset="0"/>
+              </a:rPr>
+              <a:t> `</a:t>
+            </a:r>
+          </a:p>
+          <a:p>
+            <a:pPr marL="0" indent="0">
+              <a:buNone/>
+            </a:pPr>
+            <a:r>
+              <a:rPr lang="en-US" b="0" dirty="0">
+                <a:effectLst/>
+                <a:latin typeface="Consolas" panose="020B0609020204030204" pitchFamily="49" charset="0"/>
+              </a:rPr>
+              <a:t> -e SA_PASSWORD=</a:t>
+            </a:r>
+            <a:r>
+              <a:rPr lang="en-US" b="0" dirty="0">
+                <a:solidFill>
+                  <a:schemeClr val="accent6"/>
+                </a:solidFill>
+                <a:effectLst/>
+                <a:latin typeface="Consolas" panose="020B0609020204030204" pitchFamily="49" charset="0"/>
+              </a:rPr>
+              <a:t>$Password</a:t>
+            </a:r>
+            <a:r>
+              <a:rPr lang="en-US" b="0" dirty="0">
+                <a:effectLst/>
+                <a:latin typeface="Consolas" panose="020B0609020204030204" pitchFamily="49" charset="0"/>
+              </a:rPr>
+              <a:t> `</a:t>
+            </a:r>
+          </a:p>
+          <a:p>
+            <a:pPr marL="0" indent="0">
+              <a:buNone/>
+            </a:pPr>
+            <a:r>
+              <a:rPr lang="en-US" b="0" dirty="0">
+                <a:effectLst/>
+                <a:latin typeface="Consolas" panose="020B0609020204030204" pitchFamily="49" charset="0"/>
+              </a:rPr>
+              <a:t> -e ACCEPT_EULA=</a:t>
+            </a:r>
+            <a:r>
+              <a:rPr lang="en-US" b="0" dirty="0">
+                <a:solidFill>
+                  <a:schemeClr val="accent1"/>
+                </a:solidFill>
+                <a:effectLst/>
+                <a:latin typeface="Consolas" panose="020B0609020204030204" pitchFamily="49" charset="0"/>
+              </a:rPr>
+              <a:t>Y</a:t>
+            </a:r>
+            <a:r>
+              <a:rPr lang="en-US" b="0" dirty="0">
+                <a:effectLst/>
+                <a:latin typeface="Consolas" panose="020B0609020204030204" pitchFamily="49" charset="0"/>
+              </a:rPr>
+              <a:t> `</a:t>
+            </a:r>
+          </a:p>
+          <a:p>
+            <a:pPr marL="0" indent="0">
+              <a:buNone/>
+            </a:pPr>
+            <a:r>
+              <a:rPr lang="en-US" b="0" dirty="0">
+                <a:effectLst/>
+                <a:latin typeface="Consolas" panose="020B0609020204030204" pitchFamily="49" charset="0"/>
+              </a:rPr>
+              <a:t> -v </a:t>
+            </a:r>
+            <a:r>
+              <a:rPr lang="en-US" b="0" dirty="0" err="1">
+                <a:solidFill>
+                  <a:schemeClr val="accent1"/>
+                </a:solidFill>
+                <a:effectLst/>
+                <a:latin typeface="Consolas" panose="020B0609020204030204" pitchFamily="49" charset="0"/>
+              </a:rPr>
+              <a:t>aw_preprod_backup</a:t>
+            </a:r>
+            <a:r>
+              <a:rPr lang="en-US" b="0" dirty="0">
+                <a:solidFill>
+                  <a:schemeClr val="accent2">
+                    <a:lumMod val="75000"/>
+                  </a:schemeClr>
+                </a:solidFill>
+                <a:effectLst/>
+                <a:latin typeface="Consolas" panose="020B0609020204030204" pitchFamily="49" charset="0"/>
+              </a:rPr>
+              <a:t>:</a:t>
+            </a:r>
+            <a:r>
+              <a:rPr lang="en-US" b="0" dirty="0">
+                <a:solidFill>
+                  <a:schemeClr val="accent2"/>
+                </a:solidFill>
+                <a:effectLst/>
+                <a:latin typeface="Consolas" panose="020B0609020204030204" pitchFamily="49" charset="0"/>
+              </a:rPr>
+              <a:t>/var/opt/</a:t>
+            </a:r>
+            <a:r>
+              <a:rPr lang="en-US" b="0" dirty="0" err="1">
+                <a:solidFill>
+                  <a:schemeClr val="accent2"/>
+                </a:solidFill>
+                <a:effectLst/>
+                <a:latin typeface="Consolas" panose="020B0609020204030204" pitchFamily="49" charset="0"/>
+              </a:rPr>
+              <a:t>mssql</a:t>
+            </a:r>
+            <a:r>
+              <a:rPr lang="en-US" b="0" dirty="0">
+                <a:solidFill>
+                  <a:schemeClr val="accent2"/>
+                </a:solidFill>
+                <a:effectLst/>
+                <a:latin typeface="Consolas" panose="020B0609020204030204" pitchFamily="49" charset="0"/>
+              </a:rPr>
+              <a:t>/backup</a:t>
+            </a:r>
+            <a:r>
+              <a:rPr lang="en-US" b="0" dirty="0">
+                <a:effectLst/>
+                <a:latin typeface="Consolas" panose="020B0609020204030204" pitchFamily="49" charset="0"/>
+              </a:rPr>
+              <a:t> `</a:t>
+            </a:r>
+          </a:p>
+          <a:p>
+            <a:pPr marL="0" indent="0">
+              <a:buNone/>
+            </a:pPr>
+            <a:r>
+              <a:rPr lang="en-US" b="0" dirty="0">
+                <a:effectLst/>
+                <a:latin typeface="Consolas" panose="020B0609020204030204" pitchFamily="49" charset="0"/>
+              </a:rPr>
+              <a:t> --rm `</a:t>
+            </a:r>
+          </a:p>
+          <a:p>
+            <a:pPr marL="0" indent="0">
+              <a:buNone/>
+            </a:pPr>
+            <a:r>
+              <a:rPr lang="en-US" b="0" dirty="0">
+                <a:effectLst/>
+                <a:latin typeface="Consolas" panose="020B0609020204030204" pitchFamily="49" charset="0"/>
+              </a:rPr>
+              <a:t> mcr.microsoft.com/</a:t>
+            </a:r>
+            <a:r>
+              <a:rPr lang="en-US" b="0" dirty="0" err="1">
+                <a:effectLst/>
+                <a:latin typeface="Consolas" panose="020B0609020204030204" pitchFamily="49" charset="0"/>
+              </a:rPr>
+              <a:t>mssql</a:t>
+            </a:r>
+            <a:r>
+              <a:rPr lang="en-US" b="0" dirty="0">
+                <a:effectLst/>
+                <a:latin typeface="Consolas" panose="020B0609020204030204" pitchFamily="49" charset="0"/>
+              </a:rPr>
+              <a:t>/server</a:t>
+            </a:r>
+          </a:p>
+        </p:txBody>
+      </p:sp>
+      <p:sp>
+        <p:nvSpPr>
+          <p:cNvPr id="4" name="Content Placeholder 3">
+            <a:extLst>
+              <a:ext uri="{FF2B5EF4-FFF2-40B4-BE49-F238E27FC236}">
+                <a16:creationId xmlns:a16="http://schemas.microsoft.com/office/drawing/2014/main" id="{BCD04C3A-4473-4484-AD64-0ADD5D127FBC}"/>
+              </a:ext>
+            </a:extLst>
+          </p:cNvPr>
+          <p:cNvSpPr>
+            <a:spLocks noGrp="1"/>
+          </p:cNvSpPr>
+          <p:nvPr>
+            <p:ph sz="half" idx="2"/>
+          </p:nvPr>
+        </p:nvSpPr>
+        <p:spPr>
+          <a:xfrm>
+            <a:off x="6266576" y="1825625"/>
+            <a:ext cx="5380839" cy="3906435"/>
+          </a:xfrm>
+        </p:spPr>
+        <p:txBody>
+          <a:bodyPr>
+            <a:normAutofit fontScale="62500" lnSpcReduction="20000"/>
+          </a:bodyPr>
+          <a:lstStyle/>
+          <a:p>
+            <a:pPr marL="0" indent="0">
+              <a:buNone/>
+            </a:pPr>
+            <a:r>
+              <a:rPr lang="en-US" b="0" dirty="0">
+                <a:solidFill>
+                  <a:srgbClr val="FF0000"/>
+                </a:solidFill>
+                <a:effectLst/>
+                <a:latin typeface="Consolas" panose="020B0609020204030204" pitchFamily="49" charset="0"/>
+              </a:rPr>
+              <a:t>docker exec</a:t>
+            </a:r>
+            <a:r>
+              <a:rPr lang="en-US" b="0" dirty="0">
+                <a:effectLst/>
+                <a:latin typeface="Consolas" panose="020B0609020204030204" pitchFamily="49" charset="0"/>
+              </a:rPr>
+              <a:t> -it </a:t>
+            </a:r>
+            <a:r>
+              <a:rPr lang="en-US" b="0" dirty="0" err="1">
+                <a:solidFill>
+                  <a:schemeClr val="accent1"/>
+                </a:solidFill>
+                <a:effectLst/>
+                <a:latin typeface="Consolas" panose="020B0609020204030204" pitchFamily="49" charset="0"/>
+              </a:rPr>
+              <a:t>aw_preprod</a:t>
+            </a:r>
+            <a:r>
+              <a:rPr lang="en-US" b="0" dirty="0">
+                <a:effectLst/>
+                <a:latin typeface="Consolas" panose="020B0609020204030204" pitchFamily="49" charset="0"/>
+              </a:rPr>
+              <a:t> </a:t>
+            </a:r>
+            <a:r>
+              <a:rPr lang="en-US" b="0" dirty="0" err="1">
+                <a:effectLst/>
+                <a:latin typeface="Consolas" panose="020B0609020204030204" pitchFamily="49" charset="0"/>
+              </a:rPr>
+              <a:t>mkdir</a:t>
+            </a:r>
+            <a:r>
+              <a:rPr lang="en-US" b="0" dirty="0">
+                <a:effectLst/>
+                <a:latin typeface="Consolas" panose="020B0609020204030204" pitchFamily="49" charset="0"/>
+              </a:rPr>
+              <a:t> </a:t>
+            </a:r>
+            <a:r>
+              <a:rPr lang="en-US" b="0" dirty="0">
+                <a:solidFill>
+                  <a:schemeClr val="accent2">
+                    <a:lumMod val="75000"/>
+                  </a:schemeClr>
+                </a:solidFill>
+                <a:effectLst/>
+                <a:latin typeface="Consolas" panose="020B0609020204030204" pitchFamily="49" charset="0"/>
+              </a:rPr>
+              <a:t>/var/opt/</a:t>
+            </a:r>
+            <a:r>
+              <a:rPr lang="en-US" b="0" dirty="0" err="1">
+                <a:solidFill>
+                  <a:schemeClr val="accent2">
+                    <a:lumMod val="75000"/>
+                  </a:schemeClr>
+                </a:solidFill>
+                <a:effectLst/>
+                <a:latin typeface="Consolas" panose="020B0609020204030204" pitchFamily="49" charset="0"/>
+              </a:rPr>
+              <a:t>mssql</a:t>
+            </a:r>
+            <a:r>
+              <a:rPr lang="en-US" b="0" dirty="0">
+                <a:solidFill>
+                  <a:schemeClr val="accent2">
+                    <a:lumMod val="75000"/>
+                  </a:schemeClr>
+                </a:solidFill>
+                <a:effectLst/>
+                <a:latin typeface="Consolas" panose="020B0609020204030204" pitchFamily="49" charset="0"/>
+              </a:rPr>
+              <a:t>/backup</a:t>
+            </a:r>
+          </a:p>
+          <a:p>
+            <a:pPr marL="0" indent="0">
+              <a:buNone/>
+            </a:pPr>
+            <a:r>
+              <a:rPr lang="en-US" b="0" dirty="0">
+                <a:effectLst/>
+                <a:latin typeface="Consolas" panose="020B0609020204030204" pitchFamily="49" charset="0"/>
+              </a:rPr>
+              <a:t>    </a:t>
+            </a:r>
+          </a:p>
+          <a:p>
+            <a:pPr marL="0" indent="0">
+              <a:buNone/>
+            </a:pPr>
+            <a:r>
+              <a:rPr lang="en-US" b="0" dirty="0">
+                <a:solidFill>
+                  <a:srgbClr val="FF0000"/>
+                </a:solidFill>
+                <a:effectLst/>
+                <a:latin typeface="Consolas" panose="020B0609020204030204" pitchFamily="49" charset="0"/>
+              </a:rPr>
+              <a:t>docker cp</a:t>
+            </a:r>
+            <a:r>
+              <a:rPr lang="en-US" b="0" dirty="0">
+                <a:effectLst/>
+                <a:latin typeface="Consolas" panose="020B0609020204030204" pitchFamily="49" charset="0"/>
+              </a:rPr>
+              <a:t> C:\data\Backup\WideWorldImporters-Full.bak </a:t>
+            </a:r>
+            <a:r>
+              <a:rPr lang="en-US" b="0" dirty="0" err="1">
+                <a:solidFill>
+                  <a:schemeClr val="accent1"/>
+                </a:solidFill>
+                <a:effectLst/>
+                <a:latin typeface="Consolas" panose="020B0609020204030204" pitchFamily="49" charset="0"/>
+              </a:rPr>
+              <a:t>aw_preprod</a:t>
+            </a:r>
+            <a:r>
+              <a:rPr lang="en-US" b="0" dirty="0">
+                <a:solidFill>
+                  <a:schemeClr val="accent2">
+                    <a:lumMod val="75000"/>
+                  </a:schemeClr>
+                </a:solidFill>
+                <a:effectLst/>
+                <a:latin typeface="Consolas" panose="020B0609020204030204" pitchFamily="49" charset="0"/>
+              </a:rPr>
+              <a:t>:/var/opt/</a:t>
+            </a:r>
+            <a:r>
+              <a:rPr lang="en-US" b="0" dirty="0" err="1">
+                <a:solidFill>
+                  <a:schemeClr val="accent2">
+                    <a:lumMod val="75000"/>
+                  </a:schemeClr>
+                </a:solidFill>
+                <a:effectLst/>
+                <a:latin typeface="Consolas" panose="020B0609020204030204" pitchFamily="49" charset="0"/>
+              </a:rPr>
+              <a:t>mssql</a:t>
+            </a:r>
+            <a:r>
+              <a:rPr lang="en-US" b="0" dirty="0">
+                <a:solidFill>
+                  <a:schemeClr val="accent2">
+                    <a:lumMod val="75000"/>
+                  </a:schemeClr>
+                </a:solidFill>
+                <a:effectLst/>
+                <a:latin typeface="Consolas" panose="020B0609020204030204" pitchFamily="49" charset="0"/>
+              </a:rPr>
+              <a:t>/backup</a:t>
+            </a:r>
+          </a:p>
+          <a:p>
+            <a:pPr>
+              <a:buFont typeface="Wingdings" panose="05000000000000000000" pitchFamily="2" charset="2"/>
+              <a:buChar char="Ø"/>
+            </a:pPr>
+            <a:endParaRPr lang="en-US" b="0" dirty="0">
+              <a:effectLst/>
+              <a:latin typeface="Consolas" panose="020B0609020204030204" pitchFamily="49" charset="0"/>
+            </a:endParaRPr>
+          </a:p>
+          <a:p>
+            <a:pPr marL="0" indent="0">
+              <a:buNone/>
+            </a:pPr>
+            <a:r>
+              <a:rPr lang="en-US" b="0" dirty="0">
+                <a:solidFill>
+                  <a:srgbClr val="FF0000"/>
+                </a:solidFill>
+                <a:effectLst/>
+                <a:latin typeface="Consolas" panose="020B0609020204030204" pitchFamily="49" charset="0"/>
+              </a:rPr>
+              <a:t>Restore-</a:t>
+            </a:r>
+            <a:r>
+              <a:rPr lang="en-US" b="0" dirty="0" err="1">
+                <a:solidFill>
+                  <a:srgbClr val="FF0000"/>
+                </a:solidFill>
+                <a:effectLst/>
+                <a:latin typeface="Consolas" panose="020B0609020204030204" pitchFamily="49" charset="0"/>
+              </a:rPr>
+              <a:t>DbaDatabase</a:t>
+            </a:r>
+            <a:r>
+              <a:rPr lang="en-US" b="0" dirty="0">
+                <a:effectLst/>
+                <a:latin typeface="Consolas" panose="020B0609020204030204" pitchFamily="49" charset="0"/>
+              </a:rPr>
+              <a:t> </a:t>
+            </a:r>
+            <a:r>
+              <a:rPr lang="en-US" b="0" dirty="0">
+                <a:solidFill>
+                  <a:srgbClr val="EF4135"/>
+                </a:solidFill>
+                <a:effectLst/>
+                <a:latin typeface="Consolas" panose="020B0609020204030204" pitchFamily="49" charset="0"/>
+              </a:rPr>
+              <a:t>-</a:t>
+            </a:r>
+            <a:r>
+              <a:rPr lang="en-US" b="0" dirty="0" err="1">
+                <a:solidFill>
+                  <a:srgbClr val="EF4135"/>
+                </a:solidFill>
+                <a:effectLst/>
+                <a:latin typeface="Consolas" panose="020B0609020204030204" pitchFamily="49" charset="0"/>
+              </a:rPr>
+              <a:t>SqlInstance</a:t>
+            </a:r>
+            <a:r>
+              <a:rPr lang="en-US" b="0" dirty="0">
+                <a:solidFill>
+                  <a:srgbClr val="EF4135"/>
+                </a:solidFill>
+                <a:effectLst/>
+                <a:latin typeface="Consolas" panose="020B0609020204030204" pitchFamily="49" charset="0"/>
+              </a:rPr>
+              <a:t> </a:t>
+            </a:r>
+            <a:r>
+              <a:rPr lang="en-US" b="0" dirty="0">
+                <a:effectLst/>
+                <a:latin typeface="Consolas" panose="020B0609020204030204" pitchFamily="49" charset="0"/>
+              </a:rPr>
+              <a:t>localhost </a:t>
+            </a:r>
+            <a:r>
+              <a:rPr lang="en-US" b="0" dirty="0">
+                <a:solidFill>
+                  <a:srgbClr val="EF4135"/>
+                </a:solidFill>
+                <a:effectLst/>
+                <a:latin typeface="Consolas" panose="020B0609020204030204" pitchFamily="49" charset="0"/>
+              </a:rPr>
+              <a:t>-</a:t>
+            </a:r>
+            <a:r>
+              <a:rPr lang="en-US" b="0" dirty="0" err="1">
+                <a:solidFill>
+                  <a:srgbClr val="EF4135"/>
+                </a:solidFill>
+                <a:effectLst/>
+                <a:latin typeface="Consolas" panose="020B0609020204030204" pitchFamily="49" charset="0"/>
+              </a:rPr>
+              <a:t>SqlCredential</a:t>
+            </a:r>
+            <a:r>
+              <a:rPr lang="en-US" b="0" dirty="0">
+                <a:solidFill>
+                  <a:srgbClr val="EF4135"/>
+                </a:solidFill>
+                <a:effectLst/>
+                <a:latin typeface="Consolas" panose="020B0609020204030204" pitchFamily="49" charset="0"/>
+              </a:rPr>
+              <a:t> </a:t>
+            </a:r>
+            <a:r>
+              <a:rPr lang="en-US" b="0" dirty="0">
+                <a:solidFill>
+                  <a:schemeClr val="accent6"/>
+                </a:solidFill>
+                <a:effectLst/>
+                <a:latin typeface="Consolas" panose="020B0609020204030204" pitchFamily="49" charset="0"/>
+              </a:rPr>
+              <a:t>$</a:t>
+            </a:r>
+            <a:r>
+              <a:rPr lang="en-US" b="0" dirty="0" err="1">
+                <a:solidFill>
+                  <a:schemeClr val="accent6"/>
+                </a:solidFill>
+                <a:effectLst/>
+                <a:latin typeface="Consolas" panose="020B0609020204030204" pitchFamily="49" charset="0"/>
+              </a:rPr>
+              <a:t>mycred</a:t>
+            </a:r>
+            <a:r>
+              <a:rPr lang="en-US" b="0" dirty="0">
+                <a:solidFill>
+                  <a:schemeClr val="accent6"/>
+                </a:solidFill>
+                <a:effectLst/>
+                <a:latin typeface="Consolas" panose="020B0609020204030204" pitchFamily="49" charset="0"/>
+              </a:rPr>
+              <a:t> </a:t>
+            </a:r>
+            <a:r>
+              <a:rPr lang="en-US" b="0" dirty="0">
+                <a:solidFill>
+                  <a:srgbClr val="EF4135"/>
+                </a:solidFill>
+                <a:effectLst/>
+                <a:latin typeface="Consolas" panose="020B0609020204030204" pitchFamily="49" charset="0"/>
+              </a:rPr>
+              <a:t>-Path </a:t>
+            </a:r>
+            <a:r>
+              <a:rPr lang="en-US" b="0" dirty="0">
+                <a:solidFill>
+                  <a:schemeClr val="accent2"/>
+                </a:solidFill>
+                <a:effectLst/>
+                <a:latin typeface="Consolas" panose="020B0609020204030204" pitchFamily="49" charset="0"/>
+              </a:rPr>
+              <a:t>/var/opt/</a:t>
+            </a:r>
+            <a:r>
+              <a:rPr lang="en-US" b="0" dirty="0" err="1">
+                <a:solidFill>
+                  <a:schemeClr val="accent2"/>
+                </a:solidFill>
+                <a:effectLst/>
+                <a:latin typeface="Consolas" panose="020B0609020204030204" pitchFamily="49" charset="0"/>
+              </a:rPr>
+              <a:t>mssql</a:t>
+            </a:r>
+            <a:r>
+              <a:rPr lang="en-US" b="0" dirty="0">
+                <a:solidFill>
+                  <a:schemeClr val="accent2"/>
+                </a:solidFill>
+                <a:effectLst/>
+                <a:latin typeface="Consolas" panose="020B0609020204030204" pitchFamily="49" charset="0"/>
+              </a:rPr>
+              <a:t>/backup/</a:t>
+            </a:r>
+            <a:r>
+              <a:rPr lang="en-US" b="0" dirty="0" err="1">
+                <a:solidFill>
+                  <a:schemeClr val="accent2"/>
+                </a:solidFill>
+                <a:effectLst/>
+                <a:latin typeface="Consolas" panose="020B0609020204030204" pitchFamily="49" charset="0"/>
+              </a:rPr>
+              <a:t>WideWorldImporters-Full.bak</a:t>
+            </a:r>
+            <a:r>
+              <a:rPr lang="en-US" b="0" dirty="0">
+                <a:effectLst/>
+                <a:latin typeface="Consolas" panose="020B0609020204030204" pitchFamily="49" charset="0"/>
+              </a:rPr>
+              <a:t> </a:t>
+            </a:r>
+            <a:r>
+              <a:rPr lang="en-US" b="0" dirty="0">
+                <a:solidFill>
+                  <a:srgbClr val="EF4135"/>
+                </a:solidFill>
+                <a:effectLst/>
+                <a:latin typeface="Consolas" panose="020B0609020204030204" pitchFamily="49" charset="0"/>
+              </a:rPr>
+              <a:t>-</a:t>
+            </a:r>
+            <a:r>
+              <a:rPr lang="en-US" b="0" dirty="0" err="1">
+                <a:solidFill>
+                  <a:srgbClr val="EF4135"/>
+                </a:solidFill>
+                <a:effectLst/>
+                <a:latin typeface="Consolas" panose="020B0609020204030204" pitchFamily="49" charset="0"/>
+              </a:rPr>
+              <a:t>DatabaseName</a:t>
+            </a:r>
+            <a:r>
+              <a:rPr lang="en-US" b="0" dirty="0">
+                <a:solidFill>
+                  <a:srgbClr val="EF4135"/>
+                </a:solidFill>
+                <a:effectLst/>
+                <a:latin typeface="Consolas" panose="020B0609020204030204" pitchFamily="49" charset="0"/>
+              </a:rPr>
+              <a:t> </a:t>
+            </a:r>
+            <a:r>
+              <a:rPr lang="en-US" b="0" dirty="0">
+                <a:effectLst/>
+                <a:latin typeface="Consolas" panose="020B0609020204030204" pitchFamily="49" charset="0"/>
+              </a:rPr>
+              <a:t>WWI</a:t>
+            </a:r>
+          </a:p>
+          <a:p>
+            <a:br>
+              <a:rPr lang="en-US" b="0" dirty="0">
+                <a:solidFill>
+                  <a:srgbClr val="D4D4D4"/>
+                </a:solidFill>
+                <a:effectLst/>
+                <a:latin typeface="Consolas" panose="020B0609020204030204" pitchFamily="49" charset="0"/>
+              </a:rPr>
+            </a:br>
+            <a:endParaRPr lang="en-US" b="0" dirty="0">
+              <a:solidFill>
+                <a:srgbClr val="D4D4D4"/>
+              </a:solidFill>
+              <a:effectLst/>
+              <a:latin typeface="Consolas" panose="020B0609020204030204" pitchFamily="49" charset="0"/>
+            </a:endParaRPr>
+          </a:p>
+          <a:p>
+            <a:endParaRPr lang="en-US" dirty="0"/>
+          </a:p>
+        </p:txBody>
+      </p:sp>
+    </p:spTree>
+    <p:extLst>
+      <p:ext uri="{BB962C8B-B14F-4D97-AF65-F5344CB8AC3E}">
+        <p14:creationId xmlns:p14="http://schemas.microsoft.com/office/powerpoint/2010/main" val="657727825"/>
+      </p:ext>
+    </p:extLst>
+  </p:cSld>
+  <p:clrMapOvr>
+    <a:masterClrMapping/>
+  </p:clrMapOvr>
+</p:sld>
+</file>
+
+<file path=ppt/slides/slide34.xml><?xml version="1.0" encoding="utf-8"?>
+<p:sld xmlns:a="http://schemas.openxmlformats.org/drawingml/2006/main" xmlns:r="http://schemas.openxmlformats.org/officeDocument/2006/relationships" xmlns:p="http://schemas.openxmlformats.org/presentationml/2006/main">
+  <p:cSld>
+    <p:spTree>
+      <p:nvGrpSpPr>
+        <p:cNvPr id="1" name=""/>
+        <p:cNvGrpSpPr/>
+        <p:nvPr/>
+      </p:nvGrpSpPr>
+      <p:grpSpPr>
+        <a:xfrm>
+          <a:off x="0" y="0"/>
+          <a:ext cx="0" cy="0"/>
+          <a:chOff x="0" y="0"/>
+          <a:chExt cx="0" cy="0"/>
+        </a:xfrm>
+      </p:grpSpPr>
+      <p:sp>
+        <p:nvSpPr>
+          <p:cNvPr id="2" name="Title 1">
+            <a:extLst>
+              <a:ext uri="{FF2B5EF4-FFF2-40B4-BE49-F238E27FC236}">
+                <a16:creationId xmlns:a16="http://schemas.microsoft.com/office/drawing/2014/main" id="{C7C427AE-A47B-45B2-AAC8-A3F4FDF066A6}"/>
+              </a:ext>
+            </a:extLst>
+          </p:cNvPr>
+          <p:cNvSpPr>
+            <a:spLocks noGrp="1"/>
+          </p:cNvSpPr>
+          <p:nvPr>
+            <p:ph type="title"/>
+          </p:nvPr>
+        </p:nvSpPr>
+        <p:spPr/>
+        <p:txBody>
+          <a:bodyPr/>
+          <a:lstStyle/>
+          <a:p>
+            <a:r>
+              <a:rPr lang="en-US" dirty="0"/>
+              <a:t>Manage Volume Data with Helper Container</a:t>
+            </a:r>
+          </a:p>
+        </p:txBody>
+      </p:sp>
+      <p:sp>
+        <p:nvSpPr>
+          <p:cNvPr id="3" name="Content Placeholder 2">
+            <a:extLst>
+              <a:ext uri="{FF2B5EF4-FFF2-40B4-BE49-F238E27FC236}">
+                <a16:creationId xmlns:a16="http://schemas.microsoft.com/office/drawing/2014/main" id="{A234BBAA-E2A9-49D2-A088-096EEF1B745B}"/>
+              </a:ext>
+            </a:extLst>
+          </p:cNvPr>
+          <p:cNvSpPr>
+            <a:spLocks noGrp="1"/>
+          </p:cNvSpPr>
+          <p:nvPr>
+            <p:ph sz="half" idx="1"/>
+          </p:nvPr>
+        </p:nvSpPr>
+        <p:spPr>
+          <a:xfrm>
+            <a:off x="838200" y="1825625"/>
+            <a:ext cx="10335936" cy="3906435"/>
+          </a:xfrm>
+        </p:spPr>
+        <p:txBody>
+          <a:bodyPr>
+            <a:normAutofit fontScale="92500" lnSpcReduction="20000"/>
+          </a:bodyPr>
+          <a:lstStyle/>
+          <a:p>
+            <a:r>
+              <a:rPr lang="en-US" dirty="0">
+                <a:solidFill>
+                  <a:srgbClr val="EF4135"/>
+                </a:solidFill>
+              </a:rPr>
+              <a:t>docker run</a:t>
+            </a:r>
+            <a:r>
+              <a:rPr lang="en-US" dirty="0"/>
+              <a:t> -v backup:/backup </a:t>
+            </a:r>
+            <a:r>
+              <a:rPr lang="en-US" dirty="0">
+                <a:solidFill>
+                  <a:srgbClr val="EF4135"/>
+                </a:solidFill>
+              </a:rPr>
+              <a:t>--name</a:t>
+            </a:r>
+            <a:r>
+              <a:rPr lang="en-US" dirty="0"/>
+              <a:t> </a:t>
+            </a:r>
+            <a:r>
+              <a:rPr lang="en-US" dirty="0">
+                <a:solidFill>
+                  <a:schemeClr val="accent1"/>
+                </a:solidFill>
+              </a:rPr>
+              <a:t>helper</a:t>
+            </a:r>
+            <a:r>
+              <a:rPr lang="en-US" dirty="0"/>
+              <a:t> </a:t>
+            </a:r>
+            <a:r>
+              <a:rPr lang="en-US" dirty="0">
+                <a:solidFill>
+                  <a:srgbClr val="EF4135"/>
+                </a:solidFill>
+              </a:rPr>
+              <a:t>-it</a:t>
+            </a:r>
+            <a:r>
+              <a:rPr lang="en-US" dirty="0"/>
+              <a:t> mcr.microsoft.com/</a:t>
+            </a:r>
+            <a:r>
+              <a:rPr lang="en-US" dirty="0" err="1"/>
+              <a:t>powershell</a:t>
+            </a:r>
+            <a:endParaRPr lang="en-US" dirty="0"/>
+          </a:p>
+          <a:p>
+            <a:endParaRPr lang="en-US" b="0" dirty="0">
+              <a:solidFill>
+                <a:srgbClr val="EF4135"/>
+              </a:solidFill>
+              <a:effectLst/>
+              <a:latin typeface="Consolas" panose="020B0609020204030204" pitchFamily="49" charset="0"/>
+            </a:endParaRPr>
+          </a:p>
+          <a:p>
+            <a:r>
+              <a:rPr lang="en-US" b="0" dirty="0">
+                <a:solidFill>
+                  <a:srgbClr val="EF4135"/>
+                </a:solidFill>
+                <a:effectLst/>
+                <a:latin typeface="Consolas" panose="020B0609020204030204" pitchFamily="49" charset="0"/>
+              </a:rPr>
+              <a:t>docker cp</a:t>
+            </a:r>
+            <a:r>
+              <a:rPr lang="en-US" b="0" dirty="0">
+                <a:effectLst/>
+                <a:latin typeface="Consolas" panose="020B0609020204030204" pitchFamily="49" charset="0"/>
+              </a:rPr>
+              <a:t> .\</a:t>
+            </a:r>
+            <a:r>
+              <a:rPr lang="en-US" b="0" dirty="0" err="1">
+                <a:effectLst/>
+                <a:latin typeface="Consolas" panose="020B0609020204030204" pitchFamily="49" charset="0"/>
+              </a:rPr>
+              <a:t>WWI.bck</a:t>
+            </a:r>
+            <a:r>
+              <a:rPr lang="en-US" b="0" dirty="0">
+                <a:effectLst/>
+                <a:latin typeface="Consolas" panose="020B0609020204030204" pitchFamily="49" charset="0"/>
+              </a:rPr>
+              <a:t> </a:t>
+            </a:r>
+            <a:r>
+              <a:rPr lang="en-US" b="0" dirty="0">
+                <a:solidFill>
+                  <a:schemeClr val="accent1"/>
+                </a:solidFill>
+                <a:effectLst/>
+                <a:latin typeface="Consolas" panose="020B0609020204030204" pitchFamily="49" charset="0"/>
+              </a:rPr>
+              <a:t>helper</a:t>
+            </a:r>
+            <a:r>
+              <a:rPr lang="en-US" b="0" dirty="0">
+                <a:effectLst/>
+                <a:latin typeface="Consolas" panose="020B0609020204030204" pitchFamily="49" charset="0"/>
+              </a:rPr>
+              <a:t>:/backup</a:t>
+            </a:r>
+          </a:p>
+          <a:p>
+            <a:endParaRPr lang="en-US" b="0" dirty="0">
+              <a:solidFill>
+                <a:srgbClr val="EF4135"/>
+              </a:solidFill>
+              <a:effectLst/>
+              <a:latin typeface="Consolas" panose="020B0609020204030204" pitchFamily="49" charset="0"/>
+            </a:endParaRPr>
+          </a:p>
+          <a:p>
+            <a:r>
+              <a:rPr lang="en-US" b="0" dirty="0">
+                <a:solidFill>
+                  <a:srgbClr val="EF4135"/>
+                </a:solidFill>
+                <a:effectLst/>
+                <a:latin typeface="Consolas" panose="020B0609020204030204" pitchFamily="49" charset="0"/>
+              </a:rPr>
+              <a:t>docker cp</a:t>
+            </a:r>
+            <a:r>
+              <a:rPr lang="en-US" b="0" dirty="0">
+                <a:effectLst/>
+                <a:latin typeface="Consolas" panose="020B0609020204030204" pitchFamily="49" charset="0"/>
+              </a:rPr>
+              <a:t> </a:t>
+            </a:r>
+            <a:r>
+              <a:rPr lang="en-US" b="0" dirty="0">
+                <a:solidFill>
+                  <a:schemeClr val="accent1"/>
+                </a:solidFill>
+                <a:effectLst/>
+                <a:latin typeface="Consolas" panose="020B0609020204030204" pitchFamily="49" charset="0"/>
+              </a:rPr>
+              <a:t>helper</a:t>
+            </a:r>
+            <a:r>
+              <a:rPr lang="en-US" b="0" dirty="0">
+                <a:effectLst/>
+                <a:latin typeface="Consolas" panose="020B0609020204030204" pitchFamily="49" charset="0"/>
+              </a:rPr>
+              <a:t>:/backup/</a:t>
+            </a:r>
+            <a:r>
+              <a:rPr lang="en-US" b="0" dirty="0" err="1">
+                <a:effectLst/>
+                <a:latin typeface="Consolas" panose="020B0609020204030204" pitchFamily="49" charset="0"/>
+              </a:rPr>
+              <a:t>WWI.bck</a:t>
+            </a:r>
+            <a:r>
+              <a:rPr lang="en-US" b="0" dirty="0">
+                <a:effectLst/>
+                <a:latin typeface="Consolas" panose="020B0609020204030204" pitchFamily="49" charset="0"/>
+              </a:rPr>
+              <a:t> .</a:t>
+            </a:r>
+          </a:p>
+          <a:p>
+            <a:endParaRPr lang="en-US" b="0" dirty="0">
+              <a:solidFill>
+                <a:srgbClr val="EF4135"/>
+              </a:solidFill>
+              <a:effectLst/>
+              <a:latin typeface="Consolas" panose="020B0609020204030204" pitchFamily="49" charset="0"/>
+            </a:endParaRPr>
+          </a:p>
+          <a:p>
+            <a:r>
+              <a:rPr lang="en-US" b="0" dirty="0">
+                <a:solidFill>
+                  <a:srgbClr val="EF4135"/>
+                </a:solidFill>
+                <a:effectLst/>
+                <a:latin typeface="Consolas" panose="020B0609020204030204" pitchFamily="49" charset="0"/>
+              </a:rPr>
+              <a:t>docker start -</a:t>
+            </a:r>
+            <a:r>
+              <a:rPr lang="en-US" b="0" dirty="0" err="1">
+                <a:solidFill>
+                  <a:srgbClr val="EF4135"/>
+                </a:solidFill>
+                <a:effectLst/>
+                <a:latin typeface="Consolas" panose="020B0609020204030204" pitchFamily="49" charset="0"/>
+              </a:rPr>
+              <a:t>i</a:t>
+            </a:r>
+            <a:r>
+              <a:rPr lang="en-US" b="0" dirty="0">
+                <a:effectLst/>
+                <a:latin typeface="Consolas" panose="020B0609020204030204" pitchFamily="49" charset="0"/>
+              </a:rPr>
+              <a:t> </a:t>
+            </a:r>
+            <a:r>
+              <a:rPr lang="en-US" b="0" dirty="0">
+                <a:solidFill>
+                  <a:schemeClr val="accent1"/>
+                </a:solidFill>
+                <a:effectLst/>
+                <a:latin typeface="Consolas" panose="020B0609020204030204" pitchFamily="49" charset="0"/>
+              </a:rPr>
+              <a:t>helper</a:t>
+            </a:r>
+            <a:endParaRPr lang="en-US" dirty="0">
+              <a:solidFill>
+                <a:schemeClr val="accent1"/>
+              </a:solidFill>
+              <a:latin typeface="Consolas" panose="020B0609020204030204" pitchFamily="49" charset="0"/>
+            </a:endParaRPr>
+          </a:p>
+          <a:p>
+            <a:endParaRPr lang="en-US" dirty="0">
+              <a:solidFill>
+                <a:srgbClr val="EF4135"/>
+              </a:solidFill>
+              <a:latin typeface="Consolas" panose="020B0609020204030204" pitchFamily="49" charset="0"/>
+            </a:endParaRPr>
+          </a:p>
+          <a:p>
+            <a:r>
+              <a:rPr lang="en-US" dirty="0">
+                <a:solidFill>
+                  <a:srgbClr val="EF4135"/>
+                </a:solidFill>
+                <a:latin typeface="Consolas" panose="020B0609020204030204" pitchFamily="49" charset="0"/>
+              </a:rPr>
+              <a:t>d</a:t>
+            </a:r>
+            <a:r>
+              <a:rPr lang="en-US" b="0" dirty="0">
+                <a:solidFill>
+                  <a:srgbClr val="EF4135"/>
+                </a:solidFill>
+                <a:effectLst/>
+                <a:latin typeface="Consolas" panose="020B0609020204030204" pitchFamily="49" charset="0"/>
+              </a:rPr>
+              <a:t>ocker rm</a:t>
+            </a:r>
+            <a:r>
+              <a:rPr lang="en-US" b="0" dirty="0">
+                <a:effectLst/>
+                <a:latin typeface="Consolas" panose="020B0609020204030204" pitchFamily="49" charset="0"/>
+              </a:rPr>
+              <a:t> </a:t>
+            </a:r>
+            <a:r>
+              <a:rPr lang="en-US" b="0" dirty="0">
+                <a:solidFill>
+                  <a:schemeClr val="accent1"/>
+                </a:solidFill>
+                <a:effectLst/>
+                <a:latin typeface="Consolas" panose="020B0609020204030204" pitchFamily="49" charset="0"/>
+              </a:rPr>
+              <a:t>helper</a:t>
+            </a:r>
+          </a:p>
+        </p:txBody>
+      </p:sp>
+    </p:spTree>
+    <p:extLst>
+      <p:ext uri="{BB962C8B-B14F-4D97-AF65-F5344CB8AC3E}">
+        <p14:creationId xmlns:p14="http://schemas.microsoft.com/office/powerpoint/2010/main" val="1701296285"/>
+      </p:ext>
+    </p:extLst>
+  </p:cSld>
+  <p:clrMapOvr>
+    <a:masterClrMapping/>
+  </p:clrMapOvr>
+</p:sld>
+</file>
+
+<file path=ppt/slides/slide35.xml><?xml version="1.0" encoding="utf-8"?>
 <p:sld xmlns:a="http://schemas.openxmlformats.org/drawingml/2006/main" xmlns:r="http://schemas.openxmlformats.org/officeDocument/2006/relationships" xmlns:p="http://schemas.openxmlformats.org/presentationml/2006/main">
   <p:cSld>
     <p:spTree>
@@ -37029,6 +38691,15 @@
 </file>
 
 <file path=customXml/item1.xml><?xml version="1.0" encoding="utf-8"?>
+<?mso-contentType ?>
+<FormTemplates xmlns="http://schemas.microsoft.com/sharepoint/v3/contenttype/forms">
+  <Display>DocumentLibraryForm</Display>
+  <Edit>DocumentLibraryForm</Edit>
+  <New>DocumentLibraryForm</New>
+</FormTemplates>
+</file>
+
+<file path=customXml/item2.xml><?xml version="1.0" encoding="utf-8"?>
 <ct:contentTypeSchema xmlns:ct="http://schemas.microsoft.com/office/2006/metadata/contentType" xmlns:ma="http://schemas.microsoft.com/office/2006/metadata/properties/metaAttributes" ct:_="" ma:_="" ma:contentTypeName="Document" ma:contentTypeID="0x0101008A5715C365876A40AAEBF478052E19D8" ma:contentTypeVersion="13" ma:contentTypeDescription="Create a new document." ma:contentTypeScope="" ma:versionID="ac690db62c4833b624123d2430e9c052">
   <xsd:schema xmlns:xsd="http://www.w3.org/2001/XMLSchema" xmlns:xs="http://www.w3.org/2001/XMLSchema" xmlns:p="http://schemas.microsoft.com/office/2006/metadata/properties" xmlns:ns2="6495d22d-ac5c-40e9-9004-a0ad722ffa27" xmlns:ns3="2320308a-2752-4c09-8017-c9af96e55394" targetNamespace="http://schemas.microsoft.com/office/2006/metadata/properties" ma:root="true" ma:fieldsID="9f4c31d326122b30583dde7d49570dd2" ns2:_="" ns3:_="">
     <xsd:import namespace="6495d22d-ac5c-40e9-9004-a0ad722ffa27"/>
@@ -37251,15 +38922,6 @@
 </ct:contentTypeSchema>
 </file>
 
-<file path=customXml/item2.xml><?xml version="1.0" encoding="utf-8"?>
-<?mso-contentType ?>
-<FormTemplates xmlns="http://schemas.microsoft.com/sharepoint/v3/contenttype/forms">
-  <Display>DocumentLibraryForm</Display>
-  <Edit>DocumentLibraryForm</Edit>
-  <New>DocumentLibraryForm</New>
-</FormTemplates>
-</file>
-
 <file path=customXml/item3.xml><?xml version="1.0" encoding="utf-8"?>
 <p:properties xmlns:p="http://schemas.microsoft.com/office/2006/metadata/properties" xmlns:xsi="http://www.w3.org/2001/XMLSchema-instance" xmlns:pc="http://schemas.microsoft.com/office/infopath/2007/PartnerControls">
   <documentManagement/>
@@ -37267,6 +38929,14 @@
 </file>
 
 <file path=customXml/itemProps1.xml><?xml version="1.0" encoding="utf-8"?>
+<ds:datastoreItem xmlns:ds="http://schemas.openxmlformats.org/officeDocument/2006/customXml" ds:itemID="{B5600634-5921-487F-93B3-8B1A37240393}">
+  <ds:schemaRefs>
+    <ds:schemaRef ds:uri="http://schemas.microsoft.com/sharepoint/v3/contenttype/forms"/>
+  </ds:schemaRefs>
+</ds:datastoreItem>
+</file>
+
+<file path=customXml/itemProps2.xml><?xml version="1.0" encoding="utf-8"?>
 <ds:datastoreItem xmlns:ds="http://schemas.openxmlformats.org/officeDocument/2006/customXml" ds:itemID="{EE7ACCCF-097A-4451-83E9-1D7125DF1A27}">
   <ds:schemaRefs>
     <ds:schemaRef ds:uri="2320308a-2752-4c09-8017-c9af96e55394"/>
@@ -37285,14 +38955,6 @@
 </ds:datastoreItem>
 </file>
 
-<file path=customXml/itemProps2.xml><?xml version="1.0" encoding="utf-8"?>
-<ds:datastoreItem xmlns:ds="http://schemas.openxmlformats.org/officeDocument/2006/customXml" ds:itemID="{B5600634-5921-487F-93B3-8B1A37240393}">
-  <ds:schemaRefs>
-    <ds:schemaRef ds:uri="http://schemas.microsoft.com/sharepoint/v3/contenttype/forms"/>
-  </ds:schemaRefs>
-</ds:datastoreItem>
-</file>
-
 <file path=customXml/itemProps3.xml><?xml version="1.0" encoding="utf-8"?>
 <ds:datastoreItem xmlns:ds="http://schemas.openxmlformats.org/officeDocument/2006/customXml" ds:itemID="{4E939938-968F-4292-B1F5-7D5D82188517}">
   <ds:schemaRefs>

</xml_diff>